<commit_message>
updated data for lab meeting
</commit_message>
<xml_diff>
--- a/CHIP2/2024-2-21_gblockOrder/2024-3-19.pptx
+++ b/CHIP2/2024-2-21_gblockOrder/2024-3-19.pptx
@@ -6,9 +6,24 @@
   </p:sldMasterIdLst>
   <p:sldIdLst>
     <p:sldId id="256" r:id="rId2"/>
-    <p:sldId id="257" r:id="rId3"/>
-    <p:sldId id="258" r:id="rId4"/>
-    <p:sldId id="259" r:id="rId5"/>
+    <p:sldId id="275" r:id="rId3"/>
+    <p:sldId id="276" r:id="rId4"/>
+    <p:sldId id="267" r:id="rId5"/>
+    <p:sldId id="273" r:id="rId6"/>
+    <p:sldId id="272" r:id="rId7"/>
+    <p:sldId id="271" r:id="rId8"/>
+    <p:sldId id="277" r:id="rId9"/>
+    <p:sldId id="266" r:id="rId10"/>
+    <p:sldId id="274" r:id="rId11"/>
+    <p:sldId id="259" r:id="rId12"/>
+    <p:sldId id="263" r:id="rId13"/>
+    <p:sldId id="265" r:id="rId14"/>
+    <p:sldId id="264" r:id="rId15"/>
+    <p:sldId id="270" r:id="rId16"/>
+    <p:sldId id="268" r:id="rId17"/>
+    <p:sldId id="269" r:id="rId18"/>
+    <p:sldId id="278" r:id="rId19"/>
+    <p:sldId id="260" r:id="rId20"/>
   </p:sldIdLst>
   <p:sldSz cx="12192000" cy="6858000"/>
   <p:notesSz cx="6858000" cy="9144000"/>
@@ -107,7 +122,1026 @@
       </a:defRPr>
     </a:lvl9pPr>
   </p:defaultTextStyle>
+  <p:extLst>
+    <p:ext uri="{EFAFB233-063F-42B5-8137-9DF3F51BA10A}">
+      <p15:sldGuideLst xmlns:p15="http://schemas.microsoft.com/office/powerpoint/2012/main"/>
+    </p:ext>
+  </p:extLst>
 </p:presentation>
+</file>
+
+<file path=ppt/charts/chart1.xml><?xml version="1.0" encoding="utf-8"?>
+<c:chartSpace xmlns:c="http://schemas.openxmlformats.org/drawingml/2006/chart" xmlns:a="http://schemas.openxmlformats.org/drawingml/2006/main" xmlns:r="http://schemas.openxmlformats.org/officeDocument/2006/relationships" xmlns:c16r2="http://schemas.microsoft.com/office/drawing/2015/06/chart">
+  <c:date1904 val="0"/>
+  <c:lang val="en-US"/>
+  <c:roundedCorners val="0"/>
+  <mc:AlternateContent xmlns:mc="http://schemas.openxmlformats.org/markup-compatibility/2006">
+    <mc:Choice xmlns:c14="http://schemas.microsoft.com/office/drawing/2007/8/2/chart" Requires="c14">
+      <c14:style val="102"/>
+    </mc:Choice>
+    <mc:Fallback>
+      <c:style val="2"/>
+    </mc:Fallback>
+  </mc:AlternateContent>
+  <c:chart>
+    <c:title>
+      <c:tx>
+        <c:rich>
+          <a:bodyPr/>
+          <a:lstStyle/>
+          <a:p>
+            <a:pPr>
+              <a:defRPr sz="1300" b="0"/>
+            </a:pPr>
+            <a:r>
+              <a:rPr lang="en-US"/>
+              <a:t>Left</a:t>
+            </a:r>
+          </a:p>
+        </c:rich>
+      </c:tx>
+      <c:overlay val="0"/>
+    </c:title>
+    <c:autoTitleDeleted val="0"/>
+    <c:plotArea>
+      <c:layout/>
+      <c:barChart>
+        <c:barDir val="col"/>
+        <c:grouping val="clustered"/>
+        <c:varyColors val="0"/>
+        <c:ser>
+          <c:idx val="0"/>
+          <c:order val="0"/>
+          <c:tx>
+            <c:strRef>
+              <c:f>hbonds!$G$8</c:f>
+              <c:strCache>
+                <c:ptCount val="1"/>
+                <c:pt idx="0">
+                  <c:v>all</c:v>
+                </c:pt>
+              </c:strCache>
+            </c:strRef>
+          </c:tx>
+          <c:spPr>
+            <a:solidFill>
+              <a:srgbClr val="004586"/>
+            </a:solidFill>
+            <a:ln>
+              <a:noFill/>
+            </a:ln>
+          </c:spPr>
+          <c:invertIfNegative val="0"/>
+          <c:cat>
+            <c:numRef>
+              <c:f>hbonds!$F$9:$F$11</c:f>
+              <c:numCache>
+                <c:formatCode>General</c:formatCode>
+                <c:ptCount val="3"/>
+                <c:pt idx="0">
+                  <c:v>0</c:v>
+                </c:pt>
+                <c:pt idx="1">
+                  <c:v>2</c:v>
+                </c:pt>
+                <c:pt idx="2">
+                  <c:v>4</c:v>
+                </c:pt>
+              </c:numCache>
+            </c:numRef>
+          </c:cat>
+          <c:val>
+            <c:numRef>
+              <c:f>hbonds!$G$9:$G$11</c:f>
+              <c:numCache>
+                <c:formatCode>General</c:formatCode>
+                <c:ptCount val="3"/>
+                <c:pt idx="0">
+                  <c:v>0.78301886792452835</c:v>
+                </c:pt>
+                <c:pt idx="1">
+                  <c:v>0.19811320754716982</c:v>
+                </c:pt>
+                <c:pt idx="2">
+                  <c:v>1.8867924528301886E-2</c:v>
+                </c:pt>
+              </c:numCache>
+            </c:numRef>
+          </c:val>
+          <c:extLst>
+            <c:ext xmlns:c16="http://schemas.microsoft.com/office/drawing/2014/chart" uri="{C3380CC4-5D6E-409C-BE32-E72D297353CC}">
+              <c16:uniqueId val="{00000000-BA4E-44ED-831D-A0E15F55CF42}"/>
+            </c:ext>
+          </c:extLst>
+        </c:ser>
+        <c:ser>
+          <c:idx val="1"/>
+          <c:order val="1"/>
+          <c:tx>
+            <c:strRef>
+              <c:f>hbonds!$H$8</c:f>
+              <c:strCache>
+                <c:ptCount val="1"/>
+                <c:pt idx="0">
+                  <c:v>&gt; 40%</c:v>
+                </c:pt>
+              </c:strCache>
+            </c:strRef>
+          </c:tx>
+          <c:spPr>
+            <a:solidFill>
+              <a:srgbClr val="FF420E"/>
+            </a:solidFill>
+            <a:ln>
+              <a:noFill/>
+            </a:ln>
+          </c:spPr>
+          <c:invertIfNegative val="0"/>
+          <c:cat>
+            <c:numRef>
+              <c:f>hbonds!$F$9:$F$11</c:f>
+              <c:numCache>
+                <c:formatCode>General</c:formatCode>
+                <c:ptCount val="3"/>
+                <c:pt idx="0">
+                  <c:v>0</c:v>
+                </c:pt>
+                <c:pt idx="1">
+                  <c:v>2</c:v>
+                </c:pt>
+                <c:pt idx="2">
+                  <c:v>4</c:v>
+                </c:pt>
+              </c:numCache>
+            </c:numRef>
+          </c:cat>
+          <c:val>
+            <c:numRef>
+              <c:f>hbonds!$H$9:$H$11</c:f>
+              <c:numCache>
+                <c:formatCode>General</c:formatCode>
+                <c:ptCount val="3"/>
+                <c:pt idx="0">
+                  <c:v>0.70833333333333337</c:v>
+                </c:pt>
+                <c:pt idx="1">
+                  <c:v>0.29166666666666669</c:v>
+                </c:pt>
+                <c:pt idx="2">
+                  <c:v>0</c:v>
+                </c:pt>
+              </c:numCache>
+            </c:numRef>
+          </c:val>
+          <c:extLst>
+            <c:ext xmlns:c16="http://schemas.microsoft.com/office/drawing/2014/chart" uri="{C3380CC4-5D6E-409C-BE32-E72D297353CC}">
+              <c16:uniqueId val="{00000001-BA4E-44ED-831D-A0E15F55CF42}"/>
+            </c:ext>
+          </c:extLst>
+        </c:ser>
+        <c:dLbls>
+          <c:showLegendKey val="0"/>
+          <c:showVal val="0"/>
+          <c:showCatName val="0"/>
+          <c:showSerName val="0"/>
+          <c:showPercent val="0"/>
+          <c:showBubbleSize val="0"/>
+        </c:dLbls>
+        <c:gapWidth val="150"/>
+        <c:axId val="881795295"/>
+        <c:axId val="881793375"/>
+      </c:barChart>
+      <c:valAx>
+        <c:axId val="881793375"/>
+        <c:scaling>
+          <c:orientation val="minMax"/>
+        </c:scaling>
+        <c:delete val="0"/>
+        <c:axPos val="l"/>
+        <c:majorGridlines>
+          <c:spPr>
+            <a:ln>
+              <a:solidFill>
+                <a:srgbClr val="B3B3B3"/>
+              </a:solidFill>
+            </a:ln>
+          </c:spPr>
+        </c:majorGridlines>
+        <c:title>
+          <c:tx>
+            <c:rich>
+              <a:bodyPr/>
+              <a:lstStyle/>
+              <a:p>
+                <a:pPr>
+                  <a:defRPr sz="900" b="0"/>
+                </a:pPr>
+                <a:r>
+                  <a:rPr lang="en-US"/>
+                  <a:t>% Total</a:t>
+                </a:r>
+              </a:p>
+            </c:rich>
+          </c:tx>
+          <c:overlay val="0"/>
+        </c:title>
+        <c:numFmt formatCode="General" sourceLinked="1"/>
+        <c:majorTickMark val="none"/>
+        <c:minorTickMark val="none"/>
+        <c:tickLblPos val="nextTo"/>
+        <c:spPr>
+          <a:ln>
+            <a:solidFill>
+              <a:srgbClr val="B3B3B3"/>
+            </a:solidFill>
+          </a:ln>
+        </c:spPr>
+        <c:txPr>
+          <a:bodyPr/>
+          <a:lstStyle/>
+          <a:p>
+            <a:pPr>
+              <a:defRPr sz="1000" b="0"/>
+            </a:pPr>
+            <a:endParaRPr lang="en-US"/>
+          </a:p>
+        </c:txPr>
+        <c:crossAx val="881795295"/>
+        <c:crossesAt val="0"/>
+        <c:crossBetween val="between"/>
+      </c:valAx>
+      <c:catAx>
+        <c:axId val="881795295"/>
+        <c:scaling>
+          <c:orientation val="minMax"/>
+        </c:scaling>
+        <c:delete val="0"/>
+        <c:axPos val="b"/>
+        <c:title>
+          <c:tx>
+            <c:rich>
+              <a:bodyPr/>
+              <a:lstStyle/>
+              <a:p>
+                <a:pPr>
+                  <a:defRPr sz="900" b="0"/>
+                </a:pPr>
+                <a:r>
+                  <a:rPr lang="en-US"/>
+                  <a:t># hbonds</a:t>
+                </a:r>
+              </a:p>
+            </c:rich>
+          </c:tx>
+          <c:overlay val="0"/>
+        </c:title>
+        <c:numFmt formatCode="General" sourceLinked="1"/>
+        <c:majorTickMark val="none"/>
+        <c:minorTickMark val="none"/>
+        <c:tickLblPos val="nextTo"/>
+        <c:spPr>
+          <a:ln>
+            <a:solidFill>
+              <a:srgbClr val="B3B3B3"/>
+            </a:solidFill>
+          </a:ln>
+        </c:spPr>
+        <c:txPr>
+          <a:bodyPr/>
+          <a:lstStyle/>
+          <a:p>
+            <a:pPr>
+              <a:defRPr sz="1000" b="0"/>
+            </a:pPr>
+            <a:endParaRPr lang="en-US"/>
+          </a:p>
+        </c:txPr>
+        <c:crossAx val="881793375"/>
+        <c:crossesAt val="0"/>
+        <c:auto val="1"/>
+        <c:lblAlgn val="ctr"/>
+        <c:lblOffset val="100"/>
+        <c:noMultiLvlLbl val="0"/>
+      </c:catAx>
+      <c:spPr>
+        <a:noFill/>
+        <a:ln>
+          <a:solidFill>
+            <a:srgbClr val="B3B3B3"/>
+          </a:solidFill>
+          <a:prstDash val="solid"/>
+        </a:ln>
+      </c:spPr>
+    </c:plotArea>
+    <c:legend>
+      <c:legendPos val="r"/>
+      <c:overlay val="0"/>
+      <c:spPr>
+        <a:noFill/>
+        <a:ln>
+          <a:noFill/>
+        </a:ln>
+      </c:spPr>
+      <c:txPr>
+        <a:bodyPr/>
+        <a:lstStyle/>
+        <a:p>
+          <a:pPr>
+            <a:defRPr sz="1000" b="0"/>
+          </a:pPr>
+          <a:endParaRPr lang="en-US"/>
+        </a:p>
+      </c:txPr>
+    </c:legend>
+    <c:plotVisOnly val="1"/>
+    <c:dispBlanksAs val="gap"/>
+    <c:showDLblsOverMax val="0"/>
+  </c:chart>
+  <c:spPr>
+    <a:ln>
+      <a:noFill/>
+    </a:ln>
+  </c:spPr>
+  <c:externalData r:id="rId1">
+    <c:autoUpdate val="0"/>
+  </c:externalData>
+</c:chartSpace>
+</file>
+
+<file path=ppt/charts/chart2.xml><?xml version="1.0" encoding="utf-8"?>
+<c:chartSpace xmlns:c="http://schemas.openxmlformats.org/drawingml/2006/chart" xmlns:a="http://schemas.openxmlformats.org/drawingml/2006/main" xmlns:r="http://schemas.openxmlformats.org/officeDocument/2006/relationships" xmlns:c16r2="http://schemas.microsoft.com/office/drawing/2015/06/chart">
+  <c:date1904 val="0"/>
+  <c:lang val="en-US"/>
+  <c:roundedCorners val="0"/>
+  <mc:AlternateContent xmlns:mc="http://schemas.openxmlformats.org/markup-compatibility/2006">
+    <mc:Choice xmlns:c14="http://schemas.microsoft.com/office/drawing/2007/8/2/chart" Requires="c14">
+      <c14:style val="102"/>
+    </mc:Choice>
+    <mc:Fallback>
+      <c:style val="2"/>
+    </mc:Fallback>
+  </mc:AlternateContent>
+  <c:chart>
+    <c:title>
+      <c:tx>
+        <c:rich>
+          <a:bodyPr/>
+          <a:lstStyle/>
+          <a:p>
+            <a:pPr>
+              <a:defRPr sz="1300" b="0"/>
+            </a:pPr>
+            <a:r>
+              <a:rPr lang="en-US"/>
+              <a:t>Right</a:t>
+            </a:r>
+          </a:p>
+        </c:rich>
+      </c:tx>
+      <c:overlay val="0"/>
+    </c:title>
+    <c:autoTitleDeleted val="0"/>
+    <c:plotArea>
+      <c:layout/>
+      <c:barChart>
+        <c:barDir val="col"/>
+        <c:grouping val="clustered"/>
+        <c:varyColors val="0"/>
+        <c:ser>
+          <c:idx val="0"/>
+          <c:order val="0"/>
+          <c:tx>
+            <c:strRef>
+              <c:f>hbonds!$L$8</c:f>
+              <c:strCache>
+                <c:ptCount val="1"/>
+                <c:pt idx="0">
+                  <c:v>all</c:v>
+                </c:pt>
+              </c:strCache>
+            </c:strRef>
+          </c:tx>
+          <c:spPr>
+            <a:solidFill>
+              <a:srgbClr val="004586"/>
+            </a:solidFill>
+            <a:ln>
+              <a:noFill/>
+            </a:ln>
+          </c:spPr>
+          <c:invertIfNegative val="0"/>
+          <c:cat>
+            <c:numRef>
+              <c:f>hbonds!$K$9:$K$11</c:f>
+              <c:numCache>
+                <c:formatCode>General</c:formatCode>
+                <c:ptCount val="3"/>
+                <c:pt idx="0">
+                  <c:v>0</c:v>
+                </c:pt>
+                <c:pt idx="1">
+                  <c:v>1</c:v>
+                </c:pt>
+                <c:pt idx="2">
+                  <c:v>2</c:v>
+                </c:pt>
+              </c:numCache>
+            </c:numRef>
+          </c:cat>
+          <c:val>
+            <c:numRef>
+              <c:f>hbonds!$L$9:$L$11</c:f>
+              <c:numCache>
+                <c:formatCode>General</c:formatCode>
+                <c:ptCount val="3"/>
+                <c:pt idx="0">
+                  <c:v>0.68965517241379315</c:v>
+                </c:pt>
+                <c:pt idx="1">
+                  <c:v>3.4482758620689655E-2</c:v>
+                </c:pt>
+                <c:pt idx="2">
+                  <c:v>0.27586206896551724</c:v>
+                </c:pt>
+              </c:numCache>
+            </c:numRef>
+          </c:val>
+          <c:extLst>
+            <c:ext xmlns:c16="http://schemas.microsoft.com/office/drawing/2014/chart" uri="{C3380CC4-5D6E-409C-BE32-E72D297353CC}">
+              <c16:uniqueId val="{00000000-9E17-4EBC-A8C4-9785AB74A25E}"/>
+            </c:ext>
+          </c:extLst>
+        </c:ser>
+        <c:ser>
+          <c:idx val="1"/>
+          <c:order val="1"/>
+          <c:tx>
+            <c:strRef>
+              <c:f>hbonds!$M$8</c:f>
+              <c:strCache>
+                <c:ptCount val="1"/>
+                <c:pt idx="0">
+                  <c:v>&gt; 40%</c:v>
+                </c:pt>
+              </c:strCache>
+            </c:strRef>
+          </c:tx>
+          <c:spPr>
+            <a:solidFill>
+              <a:srgbClr val="FF420E"/>
+            </a:solidFill>
+            <a:ln>
+              <a:noFill/>
+            </a:ln>
+          </c:spPr>
+          <c:invertIfNegative val="0"/>
+          <c:cat>
+            <c:numRef>
+              <c:f>hbonds!$K$9:$K$11</c:f>
+              <c:numCache>
+                <c:formatCode>General</c:formatCode>
+                <c:ptCount val="3"/>
+                <c:pt idx="0">
+                  <c:v>0</c:v>
+                </c:pt>
+                <c:pt idx="1">
+                  <c:v>1</c:v>
+                </c:pt>
+                <c:pt idx="2">
+                  <c:v>2</c:v>
+                </c:pt>
+              </c:numCache>
+            </c:numRef>
+          </c:cat>
+          <c:val>
+            <c:numRef>
+              <c:f>hbonds!$M$9:$M$11</c:f>
+              <c:numCache>
+                <c:formatCode>General</c:formatCode>
+                <c:ptCount val="3"/>
+                <c:pt idx="0">
+                  <c:v>0.6</c:v>
+                </c:pt>
+                <c:pt idx="1">
+                  <c:v>0.04</c:v>
+                </c:pt>
+                <c:pt idx="2">
+                  <c:v>0.36</c:v>
+                </c:pt>
+              </c:numCache>
+            </c:numRef>
+          </c:val>
+          <c:extLst>
+            <c:ext xmlns:c16="http://schemas.microsoft.com/office/drawing/2014/chart" uri="{C3380CC4-5D6E-409C-BE32-E72D297353CC}">
+              <c16:uniqueId val="{00000001-9E17-4EBC-A8C4-9785AB74A25E}"/>
+            </c:ext>
+          </c:extLst>
+        </c:ser>
+        <c:dLbls>
+          <c:showLegendKey val="0"/>
+          <c:showVal val="0"/>
+          <c:showCatName val="0"/>
+          <c:showSerName val="0"/>
+          <c:showPercent val="0"/>
+          <c:showBubbleSize val="0"/>
+        </c:dLbls>
+        <c:gapWidth val="150"/>
+        <c:axId val="881796735"/>
+        <c:axId val="881796255"/>
+      </c:barChart>
+      <c:valAx>
+        <c:axId val="881796255"/>
+        <c:scaling>
+          <c:orientation val="minMax"/>
+        </c:scaling>
+        <c:delete val="0"/>
+        <c:axPos val="l"/>
+        <c:majorGridlines>
+          <c:spPr>
+            <a:ln>
+              <a:solidFill>
+                <a:srgbClr val="B3B3B3"/>
+              </a:solidFill>
+            </a:ln>
+          </c:spPr>
+        </c:majorGridlines>
+        <c:title>
+          <c:tx>
+            <c:rich>
+              <a:bodyPr/>
+              <a:lstStyle/>
+              <a:p>
+                <a:pPr>
+                  <a:defRPr sz="900" b="0"/>
+                </a:pPr>
+                <a:r>
+                  <a:rPr lang="en-US"/>
+                  <a:t>% Total</a:t>
+                </a:r>
+              </a:p>
+            </c:rich>
+          </c:tx>
+          <c:overlay val="0"/>
+        </c:title>
+        <c:numFmt formatCode="General" sourceLinked="1"/>
+        <c:majorTickMark val="none"/>
+        <c:minorTickMark val="none"/>
+        <c:tickLblPos val="nextTo"/>
+        <c:spPr>
+          <a:ln>
+            <a:solidFill>
+              <a:srgbClr val="B3B3B3"/>
+            </a:solidFill>
+          </a:ln>
+        </c:spPr>
+        <c:txPr>
+          <a:bodyPr/>
+          <a:lstStyle/>
+          <a:p>
+            <a:pPr>
+              <a:defRPr sz="1000" b="0"/>
+            </a:pPr>
+            <a:endParaRPr lang="en-US"/>
+          </a:p>
+        </c:txPr>
+        <c:crossAx val="881796735"/>
+        <c:crossesAt val="0"/>
+        <c:crossBetween val="between"/>
+      </c:valAx>
+      <c:catAx>
+        <c:axId val="881796735"/>
+        <c:scaling>
+          <c:orientation val="minMax"/>
+        </c:scaling>
+        <c:delete val="0"/>
+        <c:axPos val="b"/>
+        <c:title>
+          <c:tx>
+            <c:rich>
+              <a:bodyPr/>
+              <a:lstStyle/>
+              <a:p>
+                <a:pPr>
+                  <a:defRPr sz="900" b="0"/>
+                </a:pPr>
+                <a:r>
+                  <a:rPr lang="en-US"/>
+                  <a:t># hbonds</a:t>
+                </a:r>
+              </a:p>
+            </c:rich>
+          </c:tx>
+          <c:overlay val="0"/>
+        </c:title>
+        <c:numFmt formatCode="General" sourceLinked="1"/>
+        <c:majorTickMark val="none"/>
+        <c:minorTickMark val="none"/>
+        <c:tickLblPos val="nextTo"/>
+        <c:spPr>
+          <a:ln>
+            <a:solidFill>
+              <a:srgbClr val="B3B3B3"/>
+            </a:solidFill>
+          </a:ln>
+        </c:spPr>
+        <c:txPr>
+          <a:bodyPr/>
+          <a:lstStyle/>
+          <a:p>
+            <a:pPr>
+              <a:defRPr sz="1000" b="0"/>
+            </a:pPr>
+            <a:endParaRPr lang="en-US"/>
+          </a:p>
+        </c:txPr>
+        <c:crossAx val="881796255"/>
+        <c:crossesAt val="0"/>
+        <c:auto val="1"/>
+        <c:lblAlgn val="ctr"/>
+        <c:lblOffset val="100"/>
+        <c:noMultiLvlLbl val="0"/>
+      </c:catAx>
+      <c:spPr>
+        <a:noFill/>
+        <a:ln>
+          <a:solidFill>
+            <a:srgbClr val="B3B3B3"/>
+          </a:solidFill>
+          <a:prstDash val="solid"/>
+        </a:ln>
+      </c:spPr>
+    </c:plotArea>
+    <c:legend>
+      <c:legendPos val="r"/>
+      <c:overlay val="0"/>
+      <c:spPr>
+        <a:noFill/>
+        <a:ln>
+          <a:noFill/>
+        </a:ln>
+      </c:spPr>
+      <c:txPr>
+        <a:bodyPr/>
+        <a:lstStyle/>
+        <a:p>
+          <a:pPr>
+            <a:defRPr sz="1000" b="0"/>
+          </a:pPr>
+          <a:endParaRPr lang="en-US"/>
+        </a:p>
+      </c:txPr>
+    </c:legend>
+    <c:plotVisOnly val="1"/>
+    <c:dispBlanksAs val="gap"/>
+    <c:showDLblsOverMax val="0"/>
+  </c:chart>
+  <c:spPr>
+    <a:ln>
+      <a:noFill/>
+    </a:ln>
+  </c:spPr>
+  <c:externalData r:id="rId1">
+    <c:autoUpdate val="0"/>
+  </c:externalData>
+</c:chartSpace>
+</file>
+
+<file path=ppt/charts/chart3.xml><?xml version="1.0" encoding="utf-8"?>
+<c:chartSpace xmlns:c="http://schemas.openxmlformats.org/drawingml/2006/chart" xmlns:a="http://schemas.openxmlformats.org/drawingml/2006/main" xmlns:r="http://schemas.openxmlformats.org/officeDocument/2006/relationships" xmlns:c16r2="http://schemas.microsoft.com/office/drawing/2015/06/chart">
+  <c:date1904 val="0"/>
+  <c:lang val="en-US"/>
+  <c:roundedCorners val="0"/>
+  <mc:AlternateContent xmlns:mc="http://schemas.openxmlformats.org/markup-compatibility/2006">
+    <mc:Choice xmlns:c14="http://schemas.microsoft.com/office/drawing/2007/8/2/chart" Requires="c14">
+      <c14:style val="102"/>
+    </mc:Choice>
+    <mc:Fallback>
+      <c:style val="2"/>
+    </mc:Fallback>
+  </mc:AlternateContent>
+  <c:chart>
+    <c:title>
+      <c:tx>
+        <c:rich>
+          <a:bodyPr/>
+          <a:lstStyle/>
+          <a:p>
+            <a:pPr>
+              <a:defRPr sz="1300" b="0"/>
+            </a:pPr>
+            <a:r>
+              <a:rPr lang="en-US"/>
+              <a:t>GASright</a:t>
+            </a:r>
+          </a:p>
+        </c:rich>
+      </c:tx>
+      <c:overlay val="0"/>
+    </c:title>
+    <c:autoTitleDeleted val="0"/>
+    <c:plotArea>
+      <c:layout/>
+      <c:barChart>
+        <c:barDir val="col"/>
+        <c:grouping val="clustered"/>
+        <c:varyColors val="0"/>
+        <c:ser>
+          <c:idx val="0"/>
+          <c:order val="0"/>
+          <c:tx>
+            <c:strRef>
+              <c:f>hbonds!$B$8</c:f>
+              <c:strCache>
+                <c:ptCount val="1"/>
+                <c:pt idx="0">
+                  <c:v>all</c:v>
+                </c:pt>
+              </c:strCache>
+            </c:strRef>
+          </c:tx>
+          <c:spPr>
+            <a:solidFill>
+              <a:srgbClr val="004586"/>
+            </a:solidFill>
+            <a:ln>
+              <a:noFill/>
+            </a:ln>
+          </c:spPr>
+          <c:invertIfNegative val="0"/>
+          <c:cat>
+            <c:numRef>
+              <c:f>hbonds!$A$9:$A$11</c:f>
+              <c:numCache>
+                <c:formatCode>General</c:formatCode>
+                <c:ptCount val="3"/>
+                <c:pt idx="0">
+                  <c:v>0</c:v>
+                </c:pt>
+                <c:pt idx="1">
+                  <c:v>2</c:v>
+                </c:pt>
+                <c:pt idx="2">
+                  <c:v>4</c:v>
+                </c:pt>
+              </c:numCache>
+            </c:numRef>
+          </c:cat>
+          <c:val>
+            <c:numRef>
+              <c:f>hbonds!$B$9:$B$11</c:f>
+              <c:numCache>
+                <c:formatCode>General</c:formatCode>
+                <c:ptCount val="3"/>
+                <c:pt idx="0">
+                  <c:v>0.77011494252873558</c:v>
+                </c:pt>
+                <c:pt idx="1">
+                  <c:v>0.21839080459770116</c:v>
+                </c:pt>
+                <c:pt idx="2">
+                  <c:v>1.1494252873563218E-2</c:v>
+                </c:pt>
+              </c:numCache>
+            </c:numRef>
+          </c:val>
+          <c:extLst>
+            <c:ext xmlns:c16="http://schemas.microsoft.com/office/drawing/2014/chart" uri="{C3380CC4-5D6E-409C-BE32-E72D297353CC}">
+              <c16:uniqueId val="{00000000-E669-4A50-9AC9-AB2AFD061A1E}"/>
+            </c:ext>
+          </c:extLst>
+        </c:ser>
+        <c:ser>
+          <c:idx val="1"/>
+          <c:order val="1"/>
+          <c:tx>
+            <c:strRef>
+              <c:f>hbonds!$C$8</c:f>
+              <c:strCache>
+                <c:ptCount val="1"/>
+                <c:pt idx="0">
+                  <c:v>&gt; 40%</c:v>
+                </c:pt>
+              </c:strCache>
+            </c:strRef>
+          </c:tx>
+          <c:spPr>
+            <a:solidFill>
+              <a:srgbClr val="FF420E"/>
+            </a:solidFill>
+            <a:ln>
+              <a:noFill/>
+            </a:ln>
+          </c:spPr>
+          <c:invertIfNegative val="0"/>
+          <c:cat>
+            <c:numRef>
+              <c:f>hbonds!$A$9:$A$11</c:f>
+              <c:numCache>
+                <c:formatCode>General</c:formatCode>
+                <c:ptCount val="3"/>
+                <c:pt idx="0">
+                  <c:v>0</c:v>
+                </c:pt>
+                <c:pt idx="1">
+                  <c:v>2</c:v>
+                </c:pt>
+                <c:pt idx="2">
+                  <c:v>4</c:v>
+                </c:pt>
+              </c:numCache>
+            </c:numRef>
+          </c:cat>
+          <c:val>
+            <c:numRef>
+              <c:f>hbonds!$C$9:$C$11</c:f>
+              <c:numCache>
+                <c:formatCode>General</c:formatCode>
+                <c:ptCount val="3"/>
+                <c:pt idx="0">
+                  <c:v>0.81578947368421051</c:v>
+                </c:pt>
+                <c:pt idx="1">
+                  <c:v>0.18421052631578946</c:v>
+                </c:pt>
+                <c:pt idx="2">
+                  <c:v>0</c:v>
+                </c:pt>
+              </c:numCache>
+            </c:numRef>
+          </c:val>
+          <c:extLst>
+            <c:ext xmlns:c16="http://schemas.microsoft.com/office/drawing/2014/chart" uri="{C3380CC4-5D6E-409C-BE32-E72D297353CC}">
+              <c16:uniqueId val="{00000001-E669-4A50-9AC9-AB2AFD061A1E}"/>
+            </c:ext>
+          </c:extLst>
+        </c:ser>
+        <c:dLbls>
+          <c:showLegendKey val="0"/>
+          <c:showVal val="0"/>
+          <c:showCatName val="0"/>
+          <c:showSerName val="0"/>
+          <c:showPercent val="0"/>
+          <c:showBubbleSize val="0"/>
+        </c:dLbls>
+        <c:gapWidth val="150"/>
+        <c:axId val="881790975"/>
+        <c:axId val="881801055"/>
+      </c:barChart>
+      <c:valAx>
+        <c:axId val="881801055"/>
+        <c:scaling>
+          <c:orientation val="minMax"/>
+        </c:scaling>
+        <c:delete val="0"/>
+        <c:axPos val="l"/>
+        <c:majorGridlines>
+          <c:spPr>
+            <a:ln>
+              <a:solidFill>
+                <a:srgbClr val="B3B3B3"/>
+              </a:solidFill>
+            </a:ln>
+          </c:spPr>
+        </c:majorGridlines>
+        <c:title>
+          <c:tx>
+            <c:rich>
+              <a:bodyPr/>
+              <a:lstStyle/>
+              <a:p>
+                <a:pPr>
+                  <a:defRPr sz="900" b="0"/>
+                </a:pPr>
+                <a:r>
+                  <a:rPr lang="en-US"/>
+                  <a:t>% Total</a:t>
+                </a:r>
+              </a:p>
+            </c:rich>
+          </c:tx>
+          <c:overlay val="0"/>
+        </c:title>
+        <c:numFmt formatCode="General" sourceLinked="1"/>
+        <c:majorTickMark val="none"/>
+        <c:minorTickMark val="none"/>
+        <c:tickLblPos val="nextTo"/>
+        <c:spPr>
+          <a:ln>
+            <a:solidFill>
+              <a:srgbClr val="B3B3B3"/>
+            </a:solidFill>
+          </a:ln>
+        </c:spPr>
+        <c:txPr>
+          <a:bodyPr/>
+          <a:lstStyle/>
+          <a:p>
+            <a:pPr>
+              <a:defRPr sz="1000" b="0"/>
+            </a:pPr>
+            <a:endParaRPr lang="en-US"/>
+          </a:p>
+        </c:txPr>
+        <c:crossAx val="881790975"/>
+        <c:crossesAt val="0"/>
+        <c:crossBetween val="between"/>
+      </c:valAx>
+      <c:catAx>
+        <c:axId val="881790975"/>
+        <c:scaling>
+          <c:orientation val="minMax"/>
+        </c:scaling>
+        <c:delete val="0"/>
+        <c:axPos val="b"/>
+        <c:title>
+          <c:tx>
+            <c:rich>
+              <a:bodyPr/>
+              <a:lstStyle/>
+              <a:p>
+                <a:pPr>
+                  <a:defRPr sz="900" b="0"/>
+                </a:pPr>
+                <a:r>
+                  <a:rPr lang="en-US"/>
+                  <a:t># hbonds</a:t>
+                </a:r>
+              </a:p>
+            </c:rich>
+          </c:tx>
+          <c:overlay val="0"/>
+        </c:title>
+        <c:numFmt formatCode="General" sourceLinked="1"/>
+        <c:majorTickMark val="none"/>
+        <c:minorTickMark val="none"/>
+        <c:tickLblPos val="nextTo"/>
+        <c:spPr>
+          <a:ln>
+            <a:solidFill>
+              <a:srgbClr val="B3B3B3"/>
+            </a:solidFill>
+          </a:ln>
+        </c:spPr>
+        <c:txPr>
+          <a:bodyPr/>
+          <a:lstStyle/>
+          <a:p>
+            <a:pPr>
+              <a:defRPr sz="1000" b="0"/>
+            </a:pPr>
+            <a:endParaRPr lang="en-US"/>
+          </a:p>
+        </c:txPr>
+        <c:crossAx val="881801055"/>
+        <c:crossesAt val="0"/>
+        <c:auto val="1"/>
+        <c:lblAlgn val="ctr"/>
+        <c:lblOffset val="100"/>
+        <c:noMultiLvlLbl val="0"/>
+      </c:catAx>
+      <c:spPr>
+        <a:noFill/>
+        <a:ln>
+          <a:solidFill>
+            <a:srgbClr val="B3B3B3"/>
+          </a:solidFill>
+          <a:prstDash val="solid"/>
+        </a:ln>
+      </c:spPr>
+    </c:plotArea>
+    <c:legend>
+      <c:legendPos val="r"/>
+      <c:overlay val="0"/>
+      <c:spPr>
+        <a:noFill/>
+        <a:ln>
+          <a:noFill/>
+        </a:ln>
+      </c:spPr>
+      <c:txPr>
+        <a:bodyPr/>
+        <a:lstStyle/>
+        <a:p>
+          <a:pPr>
+            <a:defRPr sz="1000" b="0"/>
+          </a:pPr>
+          <a:endParaRPr lang="en-US"/>
+        </a:p>
+      </c:txPr>
+    </c:legend>
+    <c:plotVisOnly val="1"/>
+    <c:dispBlanksAs val="gap"/>
+    <c:showDLblsOverMax val="0"/>
+  </c:chart>
+  <c:spPr>
+    <a:ln>
+      <a:noFill/>
+    </a:ln>
+  </c:spPr>
+  <c:externalData r:id="rId1">
+    <c:autoUpdate val="0"/>
+  </c:externalData>
+</c:chartSpace>
 </file>
 
 <file path=ppt/slideLayouts/slideLayout1.xml><?xml version="1.0" encoding="utf-8"?>
@@ -257,7 +1291,7 @@
           <a:p>
             <a:fld id="{B0C2D396-9AFE-4183-A1C3-C421521E4A3F}" type="datetimeFigureOut">
               <a:rPr lang="en-US" smtClean="0"/>
-              <a:t>3/19/2024</a:t>
+              <a:t>3/27/2024</a:t>
             </a:fld>
             <a:endParaRPr lang="en-US"/>
           </a:p>
@@ -455,7 +1489,7 @@
           <a:p>
             <a:fld id="{B0C2D396-9AFE-4183-A1C3-C421521E4A3F}" type="datetimeFigureOut">
               <a:rPr lang="en-US" smtClean="0"/>
-              <a:t>3/19/2024</a:t>
+              <a:t>3/27/2024</a:t>
             </a:fld>
             <a:endParaRPr lang="en-US"/>
           </a:p>
@@ -663,7 +1697,7 @@
           <a:p>
             <a:fld id="{B0C2D396-9AFE-4183-A1C3-C421521E4A3F}" type="datetimeFigureOut">
               <a:rPr lang="en-US" smtClean="0"/>
-              <a:t>3/19/2024</a:t>
+              <a:t>3/27/2024</a:t>
             </a:fld>
             <a:endParaRPr lang="en-US"/>
           </a:p>
@@ -861,7 +1895,7 @@
           <a:p>
             <a:fld id="{B0C2D396-9AFE-4183-A1C3-C421521E4A3F}" type="datetimeFigureOut">
               <a:rPr lang="en-US" smtClean="0"/>
-              <a:t>3/19/2024</a:t>
+              <a:t>3/27/2024</a:t>
             </a:fld>
             <a:endParaRPr lang="en-US"/>
           </a:p>
@@ -1136,7 +2170,7 @@
           <a:p>
             <a:fld id="{B0C2D396-9AFE-4183-A1C3-C421521E4A3F}" type="datetimeFigureOut">
               <a:rPr lang="en-US" smtClean="0"/>
-              <a:t>3/19/2024</a:t>
+              <a:t>3/27/2024</a:t>
             </a:fld>
             <a:endParaRPr lang="en-US"/>
           </a:p>
@@ -1401,7 +2435,7 @@
           <a:p>
             <a:fld id="{B0C2D396-9AFE-4183-A1C3-C421521E4A3F}" type="datetimeFigureOut">
               <a:rPr lang="en-US" smtClean="0"/>
-              <a:t>3/19/2024</a:t>
+              <a:t>3/27/2024</a:t>
             </a:fld>
             <a:endParaRPr lang="en-US"/>
           </a:p>
@@ -1813,7 +2847,7 @@
           <a:p>
             <a:fld id="{B0C2D396-9AFE-4183-A1C3-C421521E4A3F}" type="datetimeFigureOut">
               <a:rPr lang="en-US" smtClean="0"/>
-              <a:t>3/19/2024</a:t>
+              <a:t>3/27/2024</a:t>
             </a:fld>
             <a:endParaRPr lang="en-US"/>
           </a:p>
@@ -1954,7 +2988,7 @@
           <a:p>
             <a:fld id="{B0C2D396-9AFE-4183-A1C3-C421521E4A3F}" type="datetimeFigureOut">
               <a:rPr lang="en-US" smtClean="0"/>
-              <a:t>3/19/2024</a:t>
+              <a:t>3/27/2024</a:t>
             </a:fld>
             <a:endParaRPr lang="en-US"/>
           </a:p>
@@ -2067,7 +3101,7 @@
           <a:p>
             <a:fld id="{B0C2D396-9AFE-4183-A1C3-C421521E4A3F}" type="datetimeFigureOut">
               <a:rPr lang="en-US" smtClean="0"/>
-              <a:t>3/19/2024</a:t>
+              <a:t>3/27/2024</a:t>
             </a:fld>
             <a:endParaRPr lang="en-US"/>
           </a:p>
@@ -2378,7 +3412,7 @@
           <a:p>
             <a:fld id="{B0C2D396-9AFE-4183-A1C3-C421521E4A3F}" type="datetimeFigureOut">
               <a:rPr lang="en-US" smtClean="0"/>
-              <a:t>3/19/2024</a:t>
+              <a:t>3/27/2024</a:t>
             </a:fld>
             <a:endParaRPr lang="en-US"/>
           </a:p>
@@ -2666,7 +3700,7 @@
           <a:p>
             <a:fld id="{B0C2D396-9AFE-4183-A1C3-C421521E4A3F}" type="datetimeFigureOut">
               <a:rPr lang="en-US" smtClean="0"/>
-              <a:t>3/19/2024</a:t>
+              <a:t>3/27/2024</a:t>
             </a:fld>
             <a:endParaRPr lang="en-US"/>
           </a:p>
@@ -2907,7 +3941,7 @@
           <a:p>
             <a:fld id="{B0C2D396-9AFE-4183-A1C3-C421521E4A3F}" type="datetimeFigureOut">
               <a:rPr lang="en-US" smtClean="0"/>
-              <a:t>3/19/2024</a:t>
+              <a:t>3/27/2024</a:t>
             </a:fld>
             <a:endParaRPr lang="en-US"/>
           </a:p>
@@ -3347,7 +4381,7 @@
           <a:p>
             <a:r>
               <a:rPr lang="en-US" dirty="0"/>
-              <a:t>2024-3-19</a:t>
+              <a:t>2024-3-28</a:t>
             </a:r>
           </a:p>
         </p:txBody>
@@ -3384,6 +4418,1297 @@
     <p:extLst>
       <p:ext uri="{BB962C8B-B14F-4D97-AF65-F5344CB8AC3E}">
         <p14:creationId xmlns:p14="http://schemas.microsoft.com/office/powerpoint/2010/main" val="2877102796"/>
+      </p:ext>
+    </p:extLst>
+  </p:cSld>
+  <p:clrMapOvr>
+    <a:masterClrMapping/>
+  </p:clrMapOvr>
+</p:sld>
+</file>
+
+<file path=ppt/slides/slide10.xml><?xml version="1.0" encoding="utf-8"?>
+<p:sld xmlns:a="http://schemas.openxmlformats.org/drawingml/2006/main" xmlns:r="http://schemas.openxmlformats.org/officeDocument/2006/relationships" xmlns:p="http://schemas.openxmlformats.org/presentationml/2006/main">
+  <p:cSld>
+    <p:spTree>
+      <p:nvGrpSpPr>
+        <p:cNvPr id="1" name=""/>
+        <p:cNvGrpSpPr/>
+        <p:nvPr/>
+      </p:nvGrpSpPr>
+      <p:grpSpPr>
+        <a:xfrm>
+          <a:off x="0" y="0"/>
+          <a:ext cx="0" cy="0"/>
+          <a:chOff x="0" y="0"/>
+          <a:chExt cx="0" cy="0"/>
+        </a:xfrm>
+      </p:grpSpPr>
+      <p:sp>
+        <p:nvSpPr>
+          <p:cNvPr id="2" name="Title 1">
+            <a:extLst>
+              <a:ext uri="{FF2B5EF4-FFF2-40B4-BE49-F238E27FC236}">
+                <a16:creationId xmlns:a16="http://schemas.microsoft.com/office/drawing/2014/main" id="{A64B7B40-6FAC-FFA6-3C9C-19A7575CBD1F}"/>
+              </a:ext>
+            </a:extLst>
+          </p:cNvPr>
+          <p:cNvSpPr>
+            <a:spLocks noGrp="1"/>
+          </p:cNvSpPr>
+          <p:nvPr>
+            <p:ph type="title"/>
+          </p:nvPr>
+        </p:nvSpPr>
+        <p:spPr/>
+        <p:txBody>
+          <a:bodyPr/>
+          <a:lstStyle/>
+          <a:p>
+            <a:r>
+              <a:rPr lang="en-US" dirty="0"/>
+              <a:t>Past few weeks</a:t>
+            </a:r>
+          </a:p>
+        </p:txBody>
+      </p:sp>
+      <p:sp>
+        <p:nvSpPr>
+          <p:cNvPr id="3" name="Content Placeholder 2">
+            <a:extLst>
+              <a:ext uri="{FF2B5EF4-FFF2-40B4-BE49-F238E27FC236}">
+                <a16:creationId xmlns:a16="http://schemas.microsoft.com/office/drawing/2014/main" id="{3172A4F4-8998-3C71-968B-D3A575FD84EF}"/>
+              </a:ext>
+            </a:extLst>
+          </p:cNvPr>
+          <p:cNvSpPr>
+            <a:spLocks noGrp="1"/>
+          </p:cNvSpPr>
+          <p:nvPr>
+            <p:ph idx="1"/>
+          </p:nvPr>
+        </p:nvSpPr>
+        <p:spPr/>
+        <p:txBody>
+          <a:bodyPr/>
+          <a:lstStyle/>
+          <a:p>
+            <a:r>
+              <a:rPr lang="en-US" dirty="0"/>
+              <a:t>7 left and 10 right designs with at least 1 </a:t>
+            </a:r>
+            <a:r>
+              <a:rPr lang="en-US" dirty="0" err="1"/>
+              <a:t>hbond</a:t>
+            </a:r>
+            <a:endParaRPr lang="en-US" dirty="0"/>
+          </a:p>
+          <a:p>
+            <a:r>
+              <a:rPr lang="en-US" dirty="0"/>
+              <a:t>Order </a:t>
+            </a:r>
+            <a:r>
+              <a:rPr lang="en-US" dirty="0" err="1"/>
+              <a:t>gblocks</a:t>
+            </a:r>
+            <a:r>
+              <a:rPr lang="en-US" dirty="0"/>
+              <a:t> with point mutants for Ser, </a:t>
+            </a:r>
+            <a:r>
+              <a:rPr lang="en-US" dirty="0" err="1"/>
+              <a:t>Thr</a:t>
+            </a:r>
+            <a:r>
+              <a:rPr lang="en-US" dirty="0"/>
+              <a:t>, and Tyr</a:t>
+            </a:r>
+          </a:p>
+          <a:p>
+            <a:r>
+              <a:rPr lang="en-US" dirty="0"/>
+              <a:t>Clone and run </a:t>
+            </a:r>
+            <a:r>
+              <a:rPr lang="en-US" dirty="0" err="1"/>
+              <a:t>toxgreen</a:t>
+            </a:r>
+            <a:endParaRPr lang="en-US" dirty="0"/>
+          </a:p>
+        </p:txBody>
+      </p:sp>
+    </p:spTree>
+    <p:extLst>
+      <p:ext uri="{BB962C8B-B14F-4D97-AF65-F5344CB8AC3E}">
+        <p14:creationId xmlns:p14="http://schemas.microsoft.com/office/powerpoint/2010/main" val="369533866"/>
+      </p:ext>
+    </p:extLst>
+  </p:cSld>
+  <p:clrMapOvr>
+    <a:masterClrMapping/>
+  </p:clrMapOvr>
+</p:sld>
+</file>
+
+<file path=ppt/slides/slide11.xml><?xml version="1.0" encoding="utf-8"?>
+<p:sld xmlns:a="http://schemas.openxmlformats.org/drawingml/2006/main" xmlns:r="http://schemas.openxmlformats.org/officeDocument/2006/relationships" xmlns:p="http://schemas.openxmlformats.org/presentationml/2006/main">
+  <p:cSld>
+    <p:spTree>
+      <p:nvGrpSpPr>
+        <p:cNvPr id="1" name=""/>
+        <p:cNvGrpSpPr/>
+        <p:nvPr/>
+      </p:nvGrpSpPr>
+      <p:grpSpPr>
+        <a:xfrm>
+          <a:off x="0" y="0"/>
+          <a:ext cx="0" cy="0"/>
+          <a:chOff x="0" y="0"/>
+          <a:chExt cx="0" cy="0"/>
+        </a:xfrm>
+      </p:grpSpPr>
+      <p:sp>
+        <p:nvSpPr>
+          <p:cNvPr id="2" name="Title 1">
+            <a:extLst>
+              <a:ext uri="{FF2B5EF4-FFF2-40B4-BE49-F238E27FC236}">
+                <a16:creationId xmlns:a16="http://schemas.microsoft.com/office/drawing/2014/main" id="{5395F485-CB01-AC37-3264-74C560A7C8A2}"/>
+              </a:ext>
+            </a:extLst>
+          </p:cNvPr>
+          <p:cNvSpPr>
+            <a:spLocks noGrp="1"/>
+          </p:cNvSpPr>
+          <p:nvPr>
+            <p:ph type="title"/>
+          </p:nvPr>
+        </p:nvSpPr>
+        <p:spPr/>
+        <p:txBody>
+          <a:bodyPr/>
+          <a:lstStyle/>
+          <a:p>
+            <a:r>
+              <a:rPr lang="en-US" dirty="0"/>
+              <a:t>TOXGREEN</a:t>
+            </a:r>
+          </a:p>
+        </p:txBody>
+      </p:sp>
+      <p:pic>
+        <p:nvPicPr>
+          <p:cNvPr id="9" name="Picture 8" descr="A graph of different colored bars&#10;&#10;Description automatically generated">
+            <a:extLst>
+              <a:ext uri="{FF2B5EF4-FFF2-40B4-BE49-F238E27FC236}">
+                <a16:creationId xmlns:a16="http://schemas.microsoft.com/office/drawing/2014/main" id="{A55436D7-19CC-4987-3FFC-C313A57019BB}"/>
+              </a:ext>
+            </a:extLst>
+          </p:cNvPr>
+          <p:cNvPicPr>
+            <a:picLocks noChangeAspect="1"/>
+          </p:cNvPicPr>
+          <p:nvPr/>
+        </p:nvPicPr>
+        <p:blipFill rotWithShape="1">
+          <a:blip r:embed="rId2">
+            <a:extLst>
+              <a:ext uri="{28A0092B-C50C-407E-A947-70E740481C1C}">
+                <a14:useLocalDpi xmlns:a14="http://schemas.microsoft.com/office/drawing/2010/main" val="0"/>
+              </a:ext>
+            </a:extLst>
+          </a:blip>
+          <a:srcRect t="12128"/>
+          <a:stretch/>
+        </p:blipFill>
+        <p:spPr>
+          <a:xfrm>
+            <a:off x="282274" y="1690688"/>
+            <a:ext cx="11720075" cy="4485351"/>
+          </a:xfrm>
+          <a:prstGeom prst="rect">
+            <a:avLst/>
+          </a:prstGeom>
+        </p:spPr>
+      </p:pic>
+      <p:sp>
+        <p:nvSpPr>
+          <p:cNvPr id="10" name="Rectangle 9">
+            <a:extLst>
+              <a:ext uri="{FF2B5EF4-FFF2-40B4-BE49-F238E27FC236}">
+                <a16:creationId xmlns:a16="http://schemas.microsoft.com/office/drawing/2014/main" id="{D449F9C5-41C5-200C-DC31-E578F60C5F8E}"/>
+              </a:ext>
+            </a:extLst>
+          </p:cNvPr>
+          <p:cNvSpPr/>
+          <p:nvPr/>
+        </p:nvSpPr>
+        <p:spPr>
+          <a:xfrm>
+            <a:off x="4341707" y="1815253"/>
+            <a:ext cx="5283200" cy="3732107"/>
+          </a:xfrm>
+          <a:prstGeom prst="rect">
+            <a:avLst/>
+          </a:prstGeom>
+          <a:solidFill>
+            <a:schemeClr val="bg1"/>
+          </a:solidFill>
+          <a:ln>
+            <a:solidFill>
+              <a:schemeClr val="bg1"/>
+            </a:solidFill>
+          </a:ln>
+        </p:spPr>
+        <p:style>
+          <a:lnRef idx="2">
+            <a:schemeClr val="accent1">
+              <a:shade val="15000"/>
+            </a:schemeClr>
+          </a:lnRef>
+          <a:fillRef idx="1">
+            <a:schemeClr val="accent1"/>
+          </a:fillRef>
+          <a:effectRef idx="0">
+            <a:schemeClr val="accent1"/>
+          </a:effectRef>
+          <a:fontRef idx="minor">
+            <a:schemeClr val="lt1"/>
+          </a:fontRef>
+        </p:style>
+        <p:txBody>
+          <a:bodyPr rtlCol="0" anchor="ctr"/>
+          <a:lstStyle/>
+          <a:p>
+            <a:pPr algn="ctr"/>
+            <a:endParaRPr lang="en-US"/>
+          </a:p>
+        </p:txBody>
+      </p:sp>
+      <p:sp>
+        <p:nvSpPr>
+          <p:cNvPr id="11" name="Rectangle 10">
+            <a:extLst>
+              <a:ext uri="{FF2B5EF4-FFF2-40B4-BE49-F238E27FC236}">
+                <a16:creationId xmlns:a16="http://schemas.microsoft.com/office/drawing/2014/main" id="{B3F744BA-DDE6-0ECF-826A-D8913E6E6C52}"/>
+              </a:ext>
+            </a:extLst>
+          </p:cNvPr>
+          <p:cNvSpPr/>
+          <p:nvPr/>
+        </p:nvSpPr>
+        <p:spPr>
+          <a:xfrm flipH="1">
+            <a:off x="9662749" y="1881514"/>
+            <a:ext cx="2301758" cy="3732107"/>
+          </a:xfrm>
+          <a:prstGeom prst="rect">
+            <a:avLst/>
+          </a:prstGeom>
+          <a:solidFill>
+            <a:schemeClr val="bg1"/>
+          </a:solidFill>
+          <a:ln>
+            <a:solidFill>
+              <a:schemeClr val="bg1"/>
+            </a:solidFill>
+          </a:ln>
+        </p:spPr>
+        <p:style>
+          <a:lnRef idx="2">
+            <a:schemeClr val="accent1">
+              <a:shade val="15000"/>
+            </a:schemeClr>
+          </a:lnRef>
+          <a:fillRef idx="1">
+            <a:schemeClr val="accent1"/>
+          </a:fillRef>
+          <a:effectRef idx="0">
+            <a:schemeClr val="accent1"/>
+          </a:effectRef>
+          <a:fontRef idx="minor">
+            <a:schemeClr val="lt1"/>
+          </a:fontRef>
+        </p:style>
+        <p:txBody>
+          <a:bodyPr rtlCol="0" anchor="ctr"/>
+          <a:lstStyle/>
+          <a:p>
+            <a:pPr algn="ctr"/>
+            <a:endParaRPr lang="en-US"/>
+          </a:p>
+        </p:txBody>
+      </p:sp>
+    </p:spTree>
+    <p:extLst>
+      <p:ext uri="{BB962C8B-B14F-4D97-AF65-F5344CB8AC3E}">
+        <p14:creationId xmlns:p14="http://schemas.microsoft.com/office/powerpoint/2010/main" val="2763258270"/>
+      </p:ext>
+    </p:extLst>
+  </p:cSld>
+  <p:clrMapOvr>
+    <a:masterClrMapping/>
+  </p:clrMapOvr>
+</p:sld>
+</file>
+
+<file path=ppt/slides/slide12.xml><?xml version="1.0" encoding="utf-8"?>
+<p:sld xmlns:a="http://schemas.openxmlformats.org/drawingml/2006/main" xmlns:r="http://schemas.openxmlformats.org/officeDocument/2006/relationships" xmlns:p="http://schemas.openxmlformats.org/presentationml/2006/main">
+  <p:cSld>
+    <p:spTree>
+      <p:nvGrpSpPr>
+        <p:cNvPr id="1" name=""/>
+        <p:cNvGrpSpPr/>
+        <p:nvPr/>
+      </p:nvGrpSpPr>
+      <p:grpSpPr>
+        <a:xfrm>
+          <a:off x="0" y="0"/>
+          <a:ext cx="0" cy="0"/>
+          <a:chOff x="0" y="0"/>
+          <a:chExt cx="0" cy="0"/>
+        </a:xfrm>
+      </p:grpSpPr>
+      <p:sp>
+        <p:nvSpPr>
+          <p:cNvPr id="2" name="Title 1">
+            <a:extLst>
+              <a:ext uri="{FF2B5EF4-FFF2-40B4-BE49-F238E27FC236}">
+                <a16:creationId xmlns:a16="http://schemas.microsoft.com/office/drawing/2014/main" id="{5395F485-CB01-AC37-3264-74C560A7C8A2}"/>
+              </a:ext>
+            </a:extLst>
+          </p:cNvPr>
+          <p:cNvSpPr>
+            <a:spLocks noGrp="1"/>
+          </p:cNvSpPr>
+          <p:nvPr>
+            <p:ph type="title"/>
+          </p:nvPr>
+        </p:nvSpPr>
+        <p:spPr/>
+        <p:txBody>
+          <a:bodyPr/>
+          <a:lstStyle/>
+          <a:p>
+            <a:r>
+              <a:rPr lang="en-US" dirty="0"/>
+              <a:t>TOXGREEN</a:t>
+            </a:r>
+          </a:p>
+        </p:txBody>
+      </p:sp>
+      <p:pic>
+        <p:nvPicPr>
+          <p:cNvPr id="9" name="Picture 8" descr="A graph of different colored bars&#10;&#10;Description automatically generated">
+            <a:extLst>
+              <a:ext uri="{FF2B5EF4-FFF2-40B4-BE49-F238E27FC236}">
+                <a16:creationId xmlns:a16="http://schemas.microsoft.com/office/drawing/2014/main" id="{A55436D7-19CC-4987-3FFC-C313A57019BB}"/>
+              </a:ext>
+            </a:extLst>
+          </p:cNvPr>
+          <p:cNvPicPr>
+            <a:picLocks noChangeAspect="1"/>
+          </p:cNvPicPr>
+          <p:nvPr/>
+        </p:nvPicPr>
+        <p:blipFill rotWithShape="1">
+          <a:blip r:embed="rId2">
+            <a:extLst>
+              <a:ext uri="{28A0092B-C50C-407E-A947-70E740481C1C}">
+                <a14:useLocalDpi xmlns:a14="http://schemas.microsoft.com/office/drawing/2010/main" val="0"/>
+              </a:ext>
+            </a:extLst>
+          </a:blip>
+          <a:srcRect t="12128"/>
+          <a:stretch/>
+        </p:blipFill>
+        <p:spPr>
+          <a:xfrm>
+            <a:off x="282274" y="1690688"/>
+            <a:ext cx="11720075" cy="4485351"/>
+          </a:xfrm>
+          <a:prstGeom prst="rect">
+            <a:avLst/>
+          </a:prstGeom>
+        </p:spPr>
+      </p:pic>
+      <p:sp>
+        <p:nvSpPr>
+          <p:cNvPr id="3" name="Rectangle 2">
+            <a:extLst>
+              <a:ext uri="{FF2B5EF4-FFF2-40B4-BE49-F238E27FC236}">
+                <a16:creationId xmlns:a16="http://schemas.microsoft.com/office/drawing/2014/main" id="{D29BAE3F-BC92-BC37-B23C-183FF5A7E949}"/>
+              </a:ext>
+            </a:extLst>
+          </p:cNvPr>
+          <p:cNvSpPr/>
+          <p:nvPr/>
+        </p:nvSpPr>
+        <p:spPr>
+          <a:xfrm>
+            <a:off x="5678557" y="1815253"/>
+            <a:ext cx="3946349" cy="3732107"/>
+          </a:xfrm>
+          <a:prstGeom prst="rect">
+            <a:avLst/>
+          </a:prstGeom>
+          <a:solidFill>
+            <a:schemeClr val="bg1"/>
+          </a:solidFill>
+          <a:ln>
+            <a:solidFill>
+              <a:schemeClr val="bg1"/>
+            </a:solidFill>
+          </a:ln>
+        </p:spPr>
+        <p:style>
+          <a:lnRef idx="2">
+            <a:schemeClr val="accent1">
+              <a:shade val="15000"/>
+            </a:schemeClr>
+          </a:lnRef>
+          <a:fillRef idx="1">
+            <a:schemeClr val="accent1"/>
+          </a:fillRef>
+          <a:effectRef idx="0">
+            <a:schemeClr val="accent1"/>
+          </a:effectRef>
+          <a:fontRef idx="minor">
+            <a:schemeClr val="lt1"/>
+          </a:fontRef>
+        </p:style>
+        <p:txBody>
+          <a:bodyPr rtlCol="0" anchor="ctr"/>
+          <a:lstStyle/>
+          <a:p>
+            <a:pPr algn="ctr"/>
+            <a:endParaRPr lang="en-US"/>
+          </a:p>
+        </p:txBody>
+      </p:sp>
+      <p:sp>
+        <p:nvSpPr>
+          <p:cNvPr id="4" name="Rectangle 3">
+            <a:extLst>
+              <a:ext uri="{FF2B5EF4-FFF2-40B4-BE49-F238E27FC236}">
+                <a16:creationId xmlns:a16="http://schemas.microsoft.com/office/drawing/2014/main" id="{E1CE2817-C111-02CA-83F5-5E4A36C9FC02}"/>
+              </a:ext>
+            </a:extLst>
+          </p:cNvPr>
+          <p:cNvSpPr/>
+          <p:nvPr/>
+        </p:nvSpPr>
+        <p:spPr>
+          <a:xfrm flipH="1">
+            <a:off x="9700591" y="3127513"/>
+            <a:ext cx="2301758" cy="2505985"/>
+          </a:xfrm>
+          <a:prstGeom prst="rect">
+            <a:avLst/>
+          </a:prstGeom>
+          <a:solidFill>
+            <a:schemeClr val="bg1"/>
+          </a:solidFill>
+          <a:ln>
+            <a:solidFill>
+              <a:schemeClr val="bg1"/>
+            </a:solidFill>
+          </a:ln>
+        </p:spPr>
+        <p:style>
+          <a:lnRef idx="2">
+            <a:schemeClr val="accent1">
+              <a:shade val="15000"/>
+            </a:schemeClr>
+          </a:lnRef>
+          <a:fillRef idx="1">
+            <a:schemeClr val="accent1"/>
+          </a:fillRef>
+          <a:effectRef idx="0">
+            <a:schemeClr val="accent1"/>
+          </a:effectRef>
+          <a:fontRef idx="minor">
+            <a:schemeClr val="lt1"/>
+          </a:fontRef>
+        </p:style>
+        <p:txBody>
+          <a:bodyPr rtlCol="0" anchor="ctr"/>
+          <a:lstStyle/>
+          <a:p>
+            <a:pPr algn="ctr"/>
+            <a:endParaRPr lang="en-US"/>
+          </a:p>
+        </p:txBody>
+      </p:sp>
+    </p:spTree>
+    <p:extLst>
+      <p:ext uri="{BB962C8B-B14F-4D97-AF65-F5344CB8AC3E}">
+        <p14:creationId xmlns:p14="http://schemas.microsoft.com/office/powerpoint/2010/main" val="1542267583"/>
+      </p:ext>
+    </p:extLst>
+  </p:cSld>
+  <p:clrMapOvr>
+    <a:masterClrMapping/>
+  </p:clrMapOvr>
+</p:sld>
+</file>
+
+<file path=ppt/slides/slide13.xml><?xml version="1.0" encoding="utf-8"?>
+<p:sld xmlns:a="http://schemas.openxmlformats.org/drawingml/2006/main" xmlns:r="http://schemas.openxmlformats.org/officeDocument/2006/relationships" xmlns:p="http://schemas.openxmlformats.org/presentationml/2006/main">
+  <p:cSld>
+    <p:spTree>
+      <p:nvGrpSpPr>
+        <p:cNvPr id="1" name=""/>
+        <p:cNvGrpSpPr/>
+        <p:nvPr/>
+      </p:nvGrpSpPr>
+      <p:grpSpPr>
+        <a:xfrm>
+          <a:off x="0" y="0"/>
+          <a:ext cx="0" cy="0"/>
+          <a:chOff x="0" y="0"/>
+          <a:chExt cx="0" cy="0"/>
+        </a:xfrm>
+      </p:grpSpPr>
+      <p:sp>
+        <p:nvSpPr>
+          <p:cNvPr id="2" name="Title 1">
+            <a:extLst>
+              <a:ext uri="{FF2B5EF4-FFF2-40B4-BE49-F238E27FC236}">
+                <a16:creationId xmlns:a16="http://schemas.microsoft.com/office/drawing/2014/main" id="{5395F485-CB01-AC37-3264-74C560A7C8A2}"/>
+              </a:ext>
+            </a:extLst>
+          </p:cNvPr>
+          <p:cNvSpPr>
+            <a:spLocks noGrp="1"/>
+          </p:cNvSpPr>
+          <p:nvPr>
+            <p:ph type="title"/>
+          </p:nvPr>
+        </p:nvSpPr>
+        <p:spPr/>
+        <p:txBody>
+          <a:bodyPr/>
+          <a:lstStyle/>
+          <a:p>
+            <a:r>
+              <a:rPr lang="en-US" dirty="0"/>
+              <a:t>TOXGREEN</a:t>
+            </a:r>
+          </a:p>
+        </p:txBody>
+      </p:sp>
+      <p:pic>
+        <p:nvPicPr>
+          <p:cNvPr id="9" name="Picture 8" descr="A graph of different colored bars&#10;&#10;Description automatically generated">
+            <a:extLst>
+              <a:ext uri="{FF2B5EF4-FFF2-40B4-BE49-F238E27FC236}">
+                <a16:creationId xmlns:a16="http://schemas.microsoft.com/office/drawing/2014/main" id="{A55436D7-19CC-4987-3FFC-C313A57019BB}"/>
+              </a:ext>
+            </a:extLst>
+          </p:cNvPr>
+          <p:cNvPicPr>
+            <a:picLocks noChangeAspect="1"/>
+          </p:cNvPicPr>
+          <p:nvPr/>
+        </p:nvPicPr>
+        <p:blipFill rotWithShape="1">
+          <a:blip r:embed="rId2">
+            <a:extLst>
+              <a:ext uri="{28A0092B-C50C-407E-A947-70E740481C1C}">
+                <a14:useLocalDpi xmlns:a14="http://schemas.microsoft.com/office/drawing/2010/main" val="0"/>
+              </a:ext>
+            </a:extLst>
+          </a:blip>
+          <a:srcRect t="12128"/>
+          <a:stretch/>
+        </p:blipFill>
+        <p:spPr>
+          <a:xfrm>
+            <a:off x="282274" y="1690688"/>
+            <a:ext cx="11720075" cy="4485351"/>
+          </a:xfrm>
+          <a:prstGeom prst="rect">
+            <a:avLst/>
+          </a:prstGeom>
+        </p:spPr>
+      </p:pic>
+      <p:sp>
+        <p:nvSpPr>
+          <p:cNvPr id="3" name="Rectangle 2">
+            <a:extLst>
+              <a:ext uri="{FF2B5EF4-FFF2-40B4-BE49-F238E27FC236}">
+                <a16:creationId xmlns:a16="http://schemas.microsoft.com/office/drawing/2014/main" id="{D29BAE3F-BC92-BC37-B23C-183FF5A7E949}"/>
+              </a:ext>
+            </a:extLst>
+          </p:cNvPr>
+          <p:cNvSpPr/>
+          <p:nvPr/>
+        </p:nvSpPr>
+        <p:spPr>
+          <a:xfrm>
+            <a:off x="7323148" y="1815253"/>
+            <a:ext cx="2301758" cy="3732107"/>
+          </a:xfrm>
+          <a:prstGeom prst="rect">
+            <a:avLst/>
+          </a:prstGeom>
+          <a:solidFill>
+            <a:schemeClr val="bg1"/>
+          </a:solidFill>
+          <a:ln>
+            <a:solidFill>
+              <a:schemeClr val="bg1"/>
+            </a:solidFill>
+          </a:ln>
+        </p:spPr>
+        <p:style>
+          <a:lnRef idx="2">
+            <a:schemeClr val="accent1">
+              <a:shade val="15000"/>
+            </a:schemeClr>
+          </a:lnRef>
+          <a:fillRef idx="1">
+            <a:schemeClr val="accent1"/>
+          </a:fillRef>
+          <a:effectRef idx="0">
+            <a:schemeClr val="accent1"/>
+          </a:effectRef>
+          <a:fontRef idx="minor">
+            <a:schemeClr val="lt1"/>
+          </a:fontRef>
+        </p:style>
+        <p:txBody>
+          <a:bodyPr rtlCol="0" anchor="ctr"/>
+          <a:lstStyle/>
+          <a:p>
+            <a:pPr algn="ctr"/>
+            <a:endParaRPr lang="en-US"/>
+          </a:p>
+        </p:txBody>
+      </p:sp>
+      <p:sp>
+        <p:nvSpPr>
+          <p:cNvPr id="4" name="Rectangle 3">
+            <a:extLst>
+              <a:ext uri="{FF2B5EF4-FFF2-40B4-BE49-F238E27FC236}">
+                <a16:creationId xmlns:a16="http://schemas.microsoft.com/office/drawing/2014/main" id="{E1CE2817-C111-02CA-83F5-5E4A36C9FC02}"/>
+              </a:ext>
+            </a:extLst>
+          </p:cNvPr>
+          <p:cNvSpPr/>
+          <p:nvPr/>
+        </p:nvSpPr>
+        <p:spPr>
+          <a:xfrm flipH="1">
+            <a:off x="9662749" y="3617843"/>
+            <a:ext cx="2301758" cy="1995777"/>
+          </a:xfrm>
+          <a:prstGeom prst="rect">
+            <a:avLst/>
+          </a:prstGeom>
+          <a:solidFill>
+            <a:schemeClr val="bg1"/>
+          </a:solidFill>
+          <a:ln>
+            <a:solidFill>
+              <a:schemeClr val="bg1"/>
+            </a:solidFill>
+          </a:ln>
+        </p:spPr>
+        <p:style>
+          <a:lnRef idx="2">
+            <a:schemeClr val="accent1">
+              <a:shade val="15000"/>
+            </a:schemeClr>
+          </a:lnRef>
+          <a:fillRef idx="1">
+            <a:schemeClr val="accent1"/>
+          </a:fillRef>
+          <a:effectRef idx="0">
+            <a:schemeClr val="accent1"/>
+          </a:effectRef>
+          <a:fontRef idx="minor">
+            <a:schemeClr val="lt1"/>
+          </a:fontRef>
+        </p:style>
+        <p:txBody>
+          <a:bodyPr rtlCol="0" anchor="ctr"/>
+          <a:lstStyle/>
+          <a:p>
+            <a:pPr algn="ctr"/>
+            <a:endParaRPr lang="en-US"/>
+          </a:p>
+        </p:txBody>
+      </p:sp>
+    </p:spTree>
+    <p:extLst>
+      <p:ext uri="{BB962C8B-B14F-4D97-AF65-F5344CB8AC3E}">
+        <p14:creationId xmlns:p14="http://schemas.microsoft.com/office/powerpoint/2010/main" val="2134239286"/>
+      </p:ext>
+    </p:extLst>
+  </p:cSld>
+  <p:clrMapOvr>
+    <a:masterClrMapping/>
+  </p:clrMapOvr>
+</p:sld>
+</file>
+
+<file path=ppt/slides/slide14.xml><?xml version="1.0" encoding="utf-8"?>
+<p:sld xmlns:a="http://schemas.openxmlformats.org/drawingml/2006/main" xmlns:r="http://schemas.openxmlformats.org/officeDocument/2006/relationships" xmlns:p="http://schemas.openxmlformats.org/presentationml/2006/main">
+  <p:cSld>
+    <p:spTree>
+      <p:nvGrpSpPr>
+        <p:cNvPr id="1" name=""/>
+        <p:cNvGrpSpPr/>
+        <p:nvPr/>
+      </p:nvGrpSpPr>
+      <p:grpSpPr>
+        <a:xfrm>
+          <a:off x="0" y="0"/>
+          <a:ext cx="0" cy="0"/>
+          <a:chOff x="0" y="0"/>
+          <a:chExt cx="0" cy="0"/>
+        </a:xfrm>
+      </p:grpSpPr>
+      <p:sp>
+        <p:nvSpPr>
+          <p:cNvPr id="2" name="Title 1">
+            <a:extLst>
+              <a:ext uri="{FF2B5EF4-FFF2-40B4-BE49-F238E27FC236}">
+                <a16:creationId xmlns:a16="http://schemas.microsoft.com/office/drawing/2014/main" id="{5395F485-CB01-AC37-3264-74C560A7C8A2}"/>
+              </a:ext>
+            </a:extLst>
+          </p:cNvPr>
+          <p:cNvSpPr>
+            <a:spLocks noGrp="1"/>
+          </p:cNvSpPr>
+          <p:nvPr>
+            <p:ph type="title"/>
+          </p:nvPr>
+        </p:nvSpPr>
+        <p:spPr/>
+        <p:txBody>
+          <a:bodyPr/>
+          <a:lstStyle/>
+          <a:p>
+            <a:r>
+              <a:rPr lang="en-US" dirty="0"/>
+              <a:t>TOXGREEN</a:t>
+            </a:r>
+          </a:p>
+        </p:txBody>
+      </p:sp>
+      <p:pic>
+        <p:nvPicPr>
+          <p:cNvPr id="9" name="Picture 8" descr="A graph of different colored bars&#10;&#10;Description automatically generated">
+            <a:extLst>
+              <a:ext uri="{FF2B5EF4-FFF2-40B4-BE49-F238E27FC236}">
+                <a16:creationId xmlns:a16="http://schemas.microsoft.com/office/drawing/2014/main" id="{A55436D7-19CC-4987-3FFC-C313A57019BB}"/>
+              </a:ext>
+            </a:extLst>
+          </p:cNvPr>
+          <p:cNvPicPr>
+            <a:picLocks noChangeAspect="1"/>
+          </p:cNvPicPr>
+          <p:nvPr/>
+        </p:nvPicPr>
+        <p:blipFill rotWithShape="1">
+          <a:blip r:embed="rId2">
+            <a:extLst>
+              <a:ext uri="{28A0092B-C50C-407E-A947-70E740481C1C}">
+                <a14:useLocalDpi xmlns:a14="http://schemas.microsoft.com/office/drawing/2010/main" val="0"/>
+              </a:ext>
+            </a:extLst>
+          </a:blip>
+          <a:srcRect t="12128"/>
+          <a:stretch/>
+        </p:blipFill>
+        <p:spPr>
+          <a:xfrm>
+            <a:off x="282274" y="1690688"/>
+            <a:ext cx="11720075" cy="4485351"/>
+          </a:xfrm>
+          <a:prstGeom prst="rect">
+            <a:avLst/>
+          </a:prstGeom>
+        </p:spPr>
+      </p:pic>
+    </p:spTree>
+    <p:extLst>
+      <p:ext uri="{BB962C8B-B14F-4D97-AF65-F5344CB8AC3E}">
+        <p14:creationId xmlns:p14="http://schemas.microsoft.com/office/powerpoint/2010/main" val="3647024802"/>
+      </p:ext>
+    </p:extLst>
+  </p:cSld>
+  <p:clrMapOvr>
+    <a:masterClrMapping/>
+  </p:clrMapOvr>
+</p:sld>
+</file>
+
+<file path=ppt/slides/slide15.xml><?xml version="1.0" encoding="utf-8"?>
+<p:sld xmlns:a="http://schemas.openxmlformats.org/drawingml/2006/main" xmlns:r="http://schemas.openxmlformats.org/officeDocument/2006/relationships" xmlns:p="http://schemas.openxmlformats.org/presentationml/2006/main">
+  <p:cSld>
+    <p:spTree>
+      <p:nvGrpSpPr>
+        <p:cNvPr id="1" name=""/>
+        <p:cNvGrpSpPr/>
+        <p:nvPr/>
+      </p:nvGrpSpPr>
+      <p:grpSpPr>
+        <a:xfrm>
+          <a:off x="0" y="0"/>
+          <a:ext cx="0" cy="0"/>
+          <a:chOff x="0" y="0"/>
+          <a:chExt cx="0" cy="0"/>
+        </a:xfrm>
+      </p:grpSpPr>
+      <p:sp>
+        <p:nvSpPr>
+          <p:cNvPr id="2" name="Title 1">
+            <a:extLst>
+              <a:ext uri="{FF2B5EF4-FFF2-40B4-BE49-F238E27FC236}">
+                <a16:creationId xmlns:a16="http://schemas.microsoft.com/office/drawing/2014/main" id="{03CD639F-3E94-417A-532C-AC31577A6B20}"/>
+              </a:ext>
+            </a:extLst>
+          </p:cNvPr>
+          <p:cNvSpPr>
+            <a:spLocks noGrp="1"/>
+          </p:cNvSpPr>
+          <p:nvPr>
+            <p:ph type="title"/>
+          </p:nvPr>
+        </p:nvSpPr>
+        <p:spPr/>
+        <p:txBody>
+          <a:bodyPr/>
+          <a:lstStyle/>
+          <a:p>
+            <a:endParaRPr lang="en-US"/>
+          </a:p>
+        </p:txBody>
+      </p:sp>
+      <p:sp>
+        <p:nvSpPr>
+          <p:cNvPr id="7" name="Content Placeholder 6">
+            <a:extLst>
+              <a:ext uri="{FF2B5EF4-FFF2-40B4-BE49-F238E27FC236}">
+                <a16:creationId xmlns:a16="http://schemas.microsoft.com/office/drawing/2014/main" id="{D539139E-C964-3176-5D67-67E247CF789C}"/>
+              </a:ext>
+            </a:extLst>
+          </p:cNvPr>
+          <p:cNvSpPr>
+            <a:spLocks noGrp="1"/>
+          </p:cNvSpPr>
+          <p:nvPr>
+            <p:ph idx="1"/>
+          </p:nvPr>
+        </p:nvSpPr>
+        <p:spPr/>
+        <p:txBody>
+          <a:bodyPr/>
+          <a:lstStyle/>
+          <a:p>
+            <a:endParaRPr lang="en-US"/>
+          </a:p>
+        </p:txBody>
+      </p:sp>
+      <p:pic>
+        <p:nvPicPr>
+          <p:cNvPr id="10" name="Content Placeholder 4" descr="A graph with a line graph and numbers&#10;&#10;Description automatically generated with medium confidence">
+            <a:extLst>
+              <a:ext uri="{FF2B5EF4-FFF2-40B4-BE49-F238E27FC236}">
+                <a16:creationId xmlns:a16="http://schemas.microsoft.com/office/drawing/2014/main" id="{AC75B29C-334E-C548-A793-84CD5097532F}"/>
+              </a:ext>
+            </a:extLst>
+          </p:cNvPr>
+          <p:cNvPicPr>
+            <a:picLocks noChangeAspect="1"/>
+          </p:cNvPicPr>
+          <p:nvPr/>
+        </p:nvPicPr>
+        <p:blipFill>
+          <a:blip r:embed="rId2">
+            <a:extLst>
+              <a:ext uri="{28A0092B-C50C-407E-A947-70E740481C1C}">
+                <a14:useLocalDpi xmlns:a14="http://schemas.microsoft.com/office/drawing/2010/main" val="0"/>
+              </a:ext>
+            </a:extLst>
+          </a:blip>
+          <a:stretch>
+            <a:fillRect/>
+          </a:stretch>
+        </p:blipFill>
+        <p:spPr>
+          <a:xfrm>
+            <a:off x="792902" y="274479"/>
+            <a:ext cx="10690289" cy="6388527"/>
+          </a:xfrm>
+          <a:prstGeom prst="rect">
+            <a:avLst/>
+          </a:prstGeom>
+        </p:spPr>
+      </p:pic>
+    </p:spTree>
+    <p:extLst>
+      <p:ext uri="{BB962C8B-B14F-4D97-AF65-F5344CB8AC3E}">
+        <p14:creationId xmlns:p14="http://schemas.microsoft.com/office/powerpoint/2010/main" val="767117231"/>
+      </p:ext>
+    </p:extLst>
+  </p:cSld>
+  <p:clrMapOvr>
+    <a:masterClrMapping/>
+  </p:clrMapOvr>
+</p:sld>
+</file>
+
+<file path=ppt/slides/slide16.xml><?xml version="1.0" encoding="utf-8"?>
+<p:sld xmlns:a="http://schemas.openxmlformats.org/drawingml/2006/main" xmlns:r="http://schemas.openxmlformats.org/officeDocument/2006/relationships" xmlns:p="http://schemas.openxmlformats.org/presentationml/2006/main">
+  <p:cSld>
+    <p:spTree>
+      <p:nvGrpSpPr>
+        <p:cNvPr id="1" name=""/>
+        <p:cNvGrpSpPr/>
+        <p:nvPr/>
+      </p:nvGrpSpPr>
+      <p:grpSpPr>
+        <a:xfrm>
+          <a:off x="0" y="0"/>
+          <a:ext cx="0" cy="0"/>
+          <a:chOff x="0" y="0"/>
+          <a:chExt cx="0" cy="0"/>
+        </a:xfrm>
+      </p:grpSpPr>
+      <p:sp>
+        <p:nvSpPr>
+          <p:cNvPr id="2" name="Title 1">
+            <a:extLst>
+              <a:ext uri="{FF2B5EF4-FFF2-40B4-BE49-F238E27FC236}">
+                <a16:creationId xmlns:a16="http://schemas.microsoft.com/office/drawing/2014/main" id="{EB85C290-147C-9766-43D8-3EC75B97672D}"/>
+              </a:ext>
+            </a:extLst>
+          </p:cNvPr>
+          <p:cNvSpPr>
+            <a:spLocks noGrp="1"/>
+          </p:cNvSpPr>
+          <p:nvPr>
+            <p:ph type="title"/>
+          </p:nvPr>
+        </p:nvSpPr>
+        <p:spPr/>
+        <p:txBody>
+          <a:bodyPr/>
+          <a:lstStyle/>
+          <a:p>
+            <a:r>
+              <a:rPr lang="en-US" dirty="0"/>
+              <a:t>Scatter </a:t>
+            </a:r>
+          </a:p>
+        </p:txBody>
+      </p:sp>
+      <p:pic>
+        <p:nvPicPr>
+          <p:cNvPr id="7" name="Picture 6" descr="A graph with a line and a line&#10;&#10;Description automatically generated with medium confidence">
+            <a:extLst>
+              <a:ext uri="{FF2B5EF4-FFF2-40B4-BE49-F238E27FC236}">
+                <a16:creationId xmlns:a16="http://schemas.microsoft.com/office/drawing/2014/main" id="{18942DE8-FC1D-E0EC-F94F-16ABC4BF2682}"/>
+              </a:ext>
+            </a:extLst>
+          </p:cNvPr>
+          <p:cNvPicPr>
+            <a:picLocks noChangeAspect="1"/>
+          </p:cNvPicPr>
+          <p:nvPr/>
+        </p:nvPicPr>
+        <p:blipFill>
+          <a:blip r:embed="rId2">
+            <a:extLst>
+              <a:ext uri="{28A0092B-C50C-407E-A947-70E740481C1C}">
+                <a14:useLocalDpi xmlns:a14="http://schemas.microsoft.com/office/drawing/2010/main" val="0"/>
+              </a:ext>
+            </a:extLst>
+          </a:blip>
+          <a:stretch>
+            <a:fillRect/>
+          </a:stretch>
+        </p:blipFill>
+        <p:spPr>
+          <a:xfrm>
+            <a:off x="792903" y="274480"/>
+            <a:ext cx="10722265" cy="6388527"/>
+          </a:xfrm>
+          <a:prstGeom prst="rect">
+            <a:avLst/>
+          </a:prstGeom>
+        </p:spPr>
+      </p:pic>
+    </p:spTree>
+    <p:extLst>
+      <p:ext uri="{BB962C8B-B14F-4D97-AF65-F5344CB8AC3E}">
+        <p14:creationId xmlns:p14="http://schemas.microsoft.com/office/powerpoint/2010/main" val="1926143642"/>
+      </p:ext>
+    </p:extLst>
+  </p:cSld>
+  <p:clrMapOvr>
+    <a:masterClrMapping/>
+  </p:clrMapOvr>
+</p:sld>
+</file>
+
+<file path=ppt/slides/slide17.xml><?xml version="1.0" encoding="utf-8"?>
+<p:sld xmlns:a="http://schemas.openxmlformats.org/drawingml/2006/main" xmlns:r="http://schemas.openxmlformats.org/officeDocument/2006/relationships" xmlns:p="http://schemas.openxmlformats.org/presentationml/2006/main">
+  <p:cSld>
+    <p:spTree>
+      <p:nvGrpSpPr>
+        <p:cNvPr id="1" name=""/>
+        <p:cNvGrpSpPr/>
+        <p:nvPr/>
+      </p:nvGrpSpPr>
+      <p:grpSpPr>
+        <a:xfrm>
+          <a:off x="0" y="0"/>
+          <a:ext cx="0" cy="0"/>
+          <a:chOff x="0" y="0"/>
+          <a:chExt cx="0" cy="0"/>
+        </a:xfrm>
+      </p:grpSpPr>
+      <p:pic>
+        <p:nvPicPr>
+          <p:cNvPr id="7" name="Picture 6" descr="A graph with lines and numbers&#10;&#10;Description automatically generated">
+            <a:extLst>
+              <a:ext uri="{FF2B5EF4-FFF2-40B4-BE49-F238E27FC236}">
+                <a16:creationId xmlns:a16="http://schemas.microsoft.com/office/drawing/2014/main" id="{911A396D-6601-55F1-2823-80EEF0A10448}"/>
+              </a:ext>
+            </a:extLst>
+          </p:cNvPr>
+          <p:cNvPicPr>
+            <a:picLocks noChangeAspect="1"/>
+          </p:cNvPicPr>
+          <p:nvPr/>
+        </p:nvPicPr>
+        <p:blipFill rotWithShape="1">
+          <a:blip r:embed="rId2">
+            <a:extLst>
+              <a:ext uri="{28A0092B-C50C-407E-A947-70E740481C1C}">
+                <a14:useLocalDpi xmlns:a14="http://schemas.microsoft.com/office/drawing/2010/main" val="0"/>
+              </a:ext>
+            </a:extLst>
+          </a:blip>
+          <a:srcRect t="11253"/>
+          <a:stretch/>
+        </p:blipFill>
+        <p:spPr>
+          <a:xfrm>
+            <a:off x="2385060" y="952499"/>
+            <a:ext cx="8305800" cy="5528305"/>
+          </a:xfrm>
+          <a:prstGeom prst="rect">
+            <a:avLst/>
+          </a:prstGeom>
+        </p:spPr>
+      </p:pic>
+    </p:spTree>
+    <p:extLst>
+      <p:ext uri="{BB962C8B-B14F-4D97-AF65-F5344CB8AC3E}">
+        <p14:creationId xmlns:p14="http://schemas.microsoft.com/office/powerpoint/2010/main" val="4072166217"/>
+      </p:ext>
+    </p:extLst>
+  </p:cSld>
+  <p:clrMapOvr>
+    <a:masterClrMapping/>
+  </p:clrMapOvr>
+</p:sld>
+</file>
+
+<file path=ppt/slides/slide18.xml><?xml version="1.0" encoding="utf-8"?>
+<p:sld xmlns:a="http://schemas.openxmlformats.org/drawingml/2006/main" xmlns:r="http://schemas.openxmlformats.org/officeDocument/2006/relationships" xmlns:p="http://schemas.openxmlformats.org/presentationml/2006/main">
+  <p:cSld>
+    <p:spTree>
+      <p:nvGrpSpPr>
+        <p:cNvPr id="1" name=""/>
+        <p:cNvGrpSpPr/>
+        <p:nvPr/>
+      </p:nvGrpSpPr>
+      <p:grpSpPr>
+        <a:xfrm>
+          <a:off x="0" y="0"/>
+          <a:ext cx="0" cy="0"/>
+          <a:chOff x="0" y="0"/>
+          <a:chExt cx="0" cy="0"/>
+        </a:xfrm>
+      </p:grpSpPr>
+      <p:sp>
+        <p:nvSpPr>
+          <p:cNvPr id="2" name="Title 1">
+            <a:extLst>
+              <a:ext uri="{FF2B5EF4-FFF2-40B4-BE49-F238E27FC236}">
+                <a16:creationId xmlns:a16="http://schemas.microsoft.com/office/drawing/2014/main" id="{F9D28B55-155F-FE0C-87F9-F4506FDCB6C8}"/>
+              </a:ext>
+            </a:extLst>
+          </p:cNvPr>
+          <p:cNvSpPr>
+            <a:spLocks noGrp="1"/>
+          </p:cNvSpPr>
+          <p:nvPr>
+            <p:ph type="title"/>
+          </p:nvPr>
+        </p:nvSpPr>
+        <p:spPr/>
+        <p:txBody>
+          <a:bodyPr/>
+          <a:lstStyle/>
+          <a:p>
+            <a:r>
+              <a:rPr lang="en-US" dirty="0"/>
+              <a:t>More to do!</a:t>
+            </a:r>
+          </a:p>
+        </p:txBody>
+      </p:sp>
+      <p:sp>
+        <p:nvSpPr>
+          <p:cNvPr id="3" name="Content Placeholder 2">
+            <a:extLst>
+              <a:ext uri="{FF2B5EF4-FFF2-40B4-BE49-F238E27FC236}">
+                <a16:creationId xmlns:a16="http://schemas.microsoft.com/office/drawing/2014/main" id="{C4EE7AFE-73C1-08D3-ADBB-535F8B30A765}"/>
+              </a:ext>
+            </a:extLst>
+          </p:cNvPr>
+          <p:cNvSpPr>
+            <a:spLocks noGrp="1"/>
+          </p:cNvSpPr>
+          <p:nvPr>
+            <p:ph idx="1"/>
+          </p:nvPr>
+        </p:nvSpPr>
+        <p:spPr/>
+        <p:txBody>
+          <a:bodyPr/>
+          <a:lstStyle/>
+          <a:p>
+            <a:r>
+              <a:rPr lang="en-US" dirty="0"/>
+              <a:t>Ordered </a:t>
+            </a:r>
+            <a:r>
+              <a:rPr lang="en-US" dirty="0" err="1"/>
+              <a:t>gblocks</a:t>
+            </a:r>
+            <a:r>
+              <a:rPr lang="en-US" dirty="0"/>
+              <a:t> w/ double mutants to ensure association is reliant on switching to other </a:t>
+            </a:r>
+            <a:r>
+              <a:rPr lang="en-US" dirty="0" err="1"/>
+              <a:t>hbond</a:t>
+            </a:r>
+            <a:r>
+              <a:rPr lang="en-US" dirty="0"/>
+              <a:t> AA</a:t>
+            </a:r>
+          </a:p>
+          <a:p>
+            <a:r>
+              <a:rPr lang="en-US" dirty="0"/>
+              <a:t>Clone, run TOXGREEN, and finish writing paper</a:t>
+            </a:r>
+          </a:p>
+          <a:p>
+            <a:endParaRPr lang="en-US" dirty="0"/>
+          </a:p>
+        </p:txBody>
+      </p:sp>
+    </p:spTree>
+    <p:extLst>
+      <p:ext uri="{BB962C8B-B14F-4D97-AF65-F5344CB8AC3E}">
+        <p14:creationId xmlns:p14="http://schemas.microsoft.com/office/powerpoint/2010/main" val="3954934984"/>
+      </p:ext>
+    </p:extLst>
+  </p:cSld>
+  <p:clrMapOvr>
+    <a:masterClrMapping/>
+  </p:clrMapOvr>
+</p:sld>
+</file>
+
+<file path=ppt/slides/slide19.xml><?xml version="1.0" encoding="utf-8"?>
+<p:sld xmlns:a="http://schemas.openxmlformats.org/drawingml/2006/main" xmlns:r="http://schemas.openxmlformats.org/officeDocument/2006/relationships" xmlns:p="http://schemas.openxmlformats.org/presentationml/2006/main">
+  <p:cSld>
+    <p:spTree>
+      <p:nvGrpSpPr>
+        <p:cNvPr id="1" name=""/>
+        <p:cNvGrpSpPr/>
+        <p:nvPr/>
+      </p:nvGrpSpPr>
+      <p:grpSpPr>
+        <a:xfrm>
+          <a:off x="0" y="0"/>
+          <a:ext cx="0" cy="0"/>
+          <a:chOff x="0" y="0"/>
+          <a:chExt cx="0" cy="0"/>
+        </a:xfrm>
+      </p:grpSpPr>
+      <p:sp>
+        <p:nvSpPr>
+          <p:cNvPr id="2" name="Title 1">
+            <a:extLst>
+              <a:ext uri="{FF2B5EF4-FFF2-40B4-BE49-F238E27FC236}">
+                <a16:creationId xmlns:a16="http://schemas.microsoft.com/office/drawing/2014/main" id="{BB2DF04D-3272-628C-2EA1-A2B026ABC291}"/>
+              </a:ext>
+            </a:extLst>
+          </p:cNvPr>
+          <p:cNvSpPr>
+            <a:spLocks noGrp="1"/>
+          </p:cNvSpPr>
+          <p:nvPr>
+            <p:ph type="title"/>
+          </p:nvPr>
+        </p:nvSpPr>
+        <p:spPr/>
+        <p:txBody>
+          <a:bodyPr/>
+          <a:lstStyle/>
+          <a:p>
+            <a:endParaRPr lang="en-US"/>
+          </a:p>
+        </p:txBody>
+      </p:sp>
+      <p:graphicFrame>
+        <p:nvGraphicFramePr>
+          <p:cNvPr id="4" name="Chart 3">
+            <a:extLst>
+              <a:ext uri="{FF2B5EF4-FFF2-40B4-BE49-F238E27FC236}">
+                <a16:creationId xmlns:a16="http://schemas.microsoft.com/office/drawing/2014/main" id="{817B03CE-E92D-419F-1AE0-AC114943CD73}"/>
+              </a:ext>
+            </a:extLst>
+          </p:cNvPr>
+          <p:cNvGraphicFramePr>
+            <a:graphicFrameLocks/>
+          </p:cNvGraphicFramePr>
+          <p:nvPr>
+            <p:extLst>
+              <p:ext uri="{D42A27DB-BD31-4B8C-83A1-F6EECF244321}">
+                <p14:modId xmlns:p14="http://schemas.microsoft.com/office/powerpoint/2010/main" val="3702669484"/>
+              </p:ext>
+            </p:extLst>
+          </p:nvPr>
+        </p:nvGraphicFramePr>
+        <p:xfrm>
+          <a:off x="-128595" y="2164556"/>
+          <a:ext cx="5759622" cy="3239627"/>
+        </p:xfrm>
+        <a:graphic>
+          <a:graphicData uri="http://schemas.openxmlformats.org/drawingml/2006/chart">
+            <c:chart xmlns:c="http://schemas.openxmlformats.org/drawingml/2006/chart" xmlns:r="http://schemas.openxmlformats.org/officeDocument/2006/relationships" r:id="rId2"/>
+          </a:graphicData>
+        </a:graphic>
+      </p:graphicFrame>
+    </p:spTree>
+    <p:extLst>
+      <p:ext uri="{BB962C8B-B14F-4D97-AF65-F5344CB8AC3E}">
+        <p14:creationId xmlns:p14="http://schemas.microsoft.com/office/powerpoint/2010/main" val="4240684643"/>
       </p:ext>
     </p:extLst>
   </p:cSld>
@@ -3415,7 +5740,7 @@
           <p:cNvPr id="2" name="Title 1">
             <a:extLst>
               <a:ext uri="{FF2B5EF4-FFF2-40B4-BE49-F238E27FC236}">
-                <a16:creationId xmlns:a16="http://schemas.microsoft.com/office/drawing/2014/main" id="{5395F485-CB01-AC37-3264-74C560A7C8A2}"/>
+                <a16:creationId xmlns:a16="http://schemas.microsoft.com/office/drawing/2014/main" id="{78768169-4FA7-0DCE-D549-5B5B2DB8FFC9}"/>
               </a:ext>
             </a:extLst>
           </p:cNvPr>
@@ -3433,73 +5758,44 @@
           <a:p>
             <a:r>
               <a:rPr lang="en-US" dirty="0"/>
-              <a:t>I’ve been up to…</a:t>
-            </a:r>
-          </a:p>
-        </p:txBody>
-      </p:sp>
-      <p:sp>
-        <p:nvSpPr>
-          <p:cNvPr id="3" name="Content Placeholder 2">
-            <a:extLst>
-              <a:ext uri="{FF2B5EF4-FFF2-40B4-BE49-F238E27FC236}">
-                <a16:creationId xmlns:a16="http://schemas.microsoft.com/office/drawing/2014/main" id="{FB49154E-8AE6-4754-AE1D-32C1C287709A}"/>
-              </a:ext>
-            </a:extLst>
-          </p:cNvPr>
-          <p:cNvSpPr>
-            <a:spLocks noGrp="1"/>
-          </p:cNvSpPr>
-          <p:nvPr>
-            <p:ph idx="1"/>
-          </p:nvPr>
-        </p:nvSpPr>
-        <p:spPr/>
-        <p:txBody>
-          <a:bodyPr/>
-          <a:lstStyle/>
-          <a:p>
-            <a:r>
-              <a:rPr lang="en-US" dirty="0"/>
-              <a:t>Writing</a:t>
-            </a:r>
-          </a:p>
-          <a:p>
-            <a:r>
-              <a:rPr lang="en-US" dirty="0"/>
-              <a:t> find potential </a:t>
-            </a:r>
-            <a:r>
-              <a:rPr lang="en-US" dirty="0" err="1"/>
-              <a:t>hbond</a:t>
-            </a:r>
-            <a:r>
-              <a:rPr lang="en-US" dirty="0"/>
-              <a:t> sequences</a:t>
-            </a:r>
-          </a:p>
-          <a:p>
-            <a:r>
-              <a:rPr lang="en-US" dirty="0" err="1"/>
-              <a:t>Gblock</a:t>
-            </a:r>
-            <a:r>
-              <a:rPr lang="en-US" dirty="0"/>
-              <a:t> cloning</a:t>
-            </a:r>
-          </a:p>
-          <a:p>
-            <a:r>
-              <a:rPr lang="en-US" dirty="0"/>
-              <a:t>TOXGREEN</a:t>
-            </a:r>
-          </a:p>
-        </p:txBody>
-      </p:sp>
+              <a:t>Finalized sort-seq data</a:t>
+            </a:r>
+          </a:p>
+        </p:txBody>
+      </p:sp>
+      <p:pic>
+        <p:nvPicPr>
+          <p:cNvPr id="5" name="Picture 4">
+            <a:extLst>
+              <a:ext uri="{FF2B5EF4-FFF2-40B4-BE49-F238E27FC236}">
+                <a16:creationId xmlns:a16="http://schemas.microsoft.com/office/drawing/2014/main" id="{F2EA744F-1EDE-148B-C228-9B181134E4A4}"/>
+              </a:ext>
+            </a:extLst>
+          </p:cNvPr>
+          <p:cNvPicPr>
+            <a:picLocks noChangeAspect="1"/>
+          </p:cNvPicPr>
+          <p:nvPr/>
+        </p:nvPicPr>
+        <p:blipFill rotWithShape="1">
+          <a:blip r:embed="rId2"/>
+          <a:srcRect t="-1" b="48489"/>
+          <a:stretch/>
+        </p:blipFill>
+        <p:spPr>
+          <a:xfrm>
+            <a:off x="0" y="2093297"/>
+            <a:ext cx="12192000" cy="2942233"/>
+          </a:xfrm>
+          <a:prstGeom prst="rect">
+            <a:avLst/>
+          </a:prstGeom>
+        </p:spPr>
+      </p:pic>
     </p:spTree>
     <p:extLst>
       <p:ext uri="{BB962C8B-B14F-4D97-AF65-F5344CB8AC3E}">
-        <p14:creationId xmlns:p14="http://schemas.microsoft.com/office/powerpoint/2010/main" val="3075484415"/>
+        <p14:creationId xmlns:p14="http://schemas.microsoft.com/office/powerpoint/2010/main" val="2053756064"/>
       </p:ext>
     </p:extLst>
   </p:cSld>
@@ -3531,7 +5827,7 @@
           <p:cNvPr id="2" name="Title 1">
             <a:extLst>
               <a:ext uri="{FF2B5EF4-FFF2-40B4-BE49-F238E27FC236}">
-                <a16:creationId xmlns:a16="http://schemas.microsoft.com/office/drawing/2014/main" id="{5395F485-CB01-AC37-3264-74C560A7C8A2}"/>
+                <a16:creationId xmlns:a16="http://schemas.microsoft.com/office/drawing/2014/main" id="{78768169-4FA7-0DCE-D549-5B5B2DB8FFC9}"/>
               </a:ext>
             </a:extLst>
           </p:cNvPr>
@@ -3548,69 +5844,72 @@
           <a:lstStyle/>
           <a:p>
             <a:r>
-              <a:rPr lang="en-US" dirty="0" err="1"/>
-              <a:t>Hbond</a:t>
-            </a:r>
-            <a:r>
               <a:rPr lang="en-US" dirty="0"/>
-              <a:t> stuff</a:t>
-            </a:r>
-          </a:p>
-        </p:txBody>
-      </p:sp>
-      <p:sp>
-        <p:nvSpPr>
-          <p:cNvPr id="3" name="Content Placeholder 2">
-            <a:extLst>
-              <a:ext uri="{FF2B5EF4-FFF2-40B4-BE49-F238E27FC236}">
-                <a16:creationId xmlns:a16="http://schemas.microsoft.com/office/drawing/2014/main" id="{FB49154E-8AE6-4754-AE1D-32C1C287709A}"/>
-              </a:ext>
-            </a:extLst>
-          </p:cNvPr>
-          <p:cNvSpPr>
-            <a:spLocks noGrp="1"/>
-          </p:cNvSpPr>
-          <p:nvPr>
-            <p:ph idx="1"/>
-          </p:nvPr>
-        </p:nvSpPr>
-        <p:spPr/>
-        <p:txBody>
-          <a:bodyPr/>
+              <a:t>All designs have at least 1 S, T, or Y</a:t>
+            </a:r>
+          </a:p>
+        </p:txBody>
+      </p:sp>
+      <p:pic>
+        <p:nvPicPr>
+          <p:cNvPr id="5" name="Picture 4">
+            <a:extLst>
+              <a:ext uri="{FF2B5EF4-FFF2-40B4-BE49-F238E27FC236}">
+                <a16:creationId xmlns:a16="http://schemas.microsoft.com/office/drawing/2014/main" id="{F2EA744F-1EDE-148B-C228-9B181134E4A4}"/>
+              </a:ext>
+            </a:extLst>
+          </p:cNvPr>
+          <p:cNvPicPr>
+            <a:picLocks noChangeAspect="1"/>
+          </p:cNvPicPr>
+          <p:nvPr/>
+        </p:nvPicPr>
+        <p:blipFill rotWithShape="1">
+          <a:blip r:embed="rId2"/>
+          <a:srcRect t="-1" b="48489"/>
+          <a:stretch/>
+        </p:blipFill>
+        <p:spPr>
+          <a:xfrm>
+            <a:off x="0" y="2093297"/>
+            <a:ext cx="12192000" cy="2942233"/>
+          </a:xfrm>
+          <a:prstGeom prst="rect">
+            <a:avLst/>
+          </a:prstGeom>
+        </p:spPr>
+      </p:pic>
+      <p:sp>
+        <p:nvSpPr>
+          <p:cNvPr id="8" name="TextBox 7">
+            <a:extLst>
+              <a:ext uri="{FF2B5EF4-FFF2-40B4-BE49-F238E27FC236}">
+                <a16:creationId xmlns:a16="http://schemas.microsoft.com/office/drawing/2014/main" id="{A1D1A600-8270-4C07-48AC-D3718CBB22C1}"/>
+              </a:ext>
+            </a:extLst>
+          </p:cNvPr>
+          <p:cNvSpPr txBox="1"/>
+          <p:nvPr/>
+        </p:nvSpPr>
+        <p:spPr>
+          <a:xfrm>
+            <a:off x="624840" y="5455920"/>
+            <a:ext cx="10820400" cy="369332"/>
+          </a:xfrm>
+          <a:prstGeom prst="rect">
+            <a:avLst/>
+          </a:prstGeom>
+          <a:noFill/>
+        </p:spPr>
+        <p:txBody>
+          <a:bodyPr wrap="square" rtlCol="0">
+            <a:spAutoFit/>
+          </a:bodyPr>
           <a:lstStyle/>
           <a:p>
             <a:r>
               <a:rPr lang="en-US" dirty="0"/>
-              <a:t>Show some figures and explain what I was doing</a:t>
-            </a:r>
-          </a:p>
-          <a:p>
-            <a:pPr lvl="1"/>
-            <a:r>
-              <a:rPr lang="en-US" dirty="0"/>
-              <a:t>Images of distances between atoms maybe focused from one image</a:t>
-            </a:r>
-          </a:p>
-          <a:p>
-            <a:pPr lvl="1"/>
-            <a:r>
-              <a:rPr lang="en-US" dirty="0"/>
-              <a:t>Did this for all of my WT structures that passed the maltose test</a:t>
-            </a:r>
-          </a:p>
-          <a:p>
-            <a:pPr lvl="1"/>
-            <a:r>
-              <a:rPr lang="en-US" dirty="0"/>
-              <a:t>Found a set of 15 sequences, mutated Ser and </a:t>
-            </a:r>
-            <a:r>
-              <a:rPr lang="en-US" dirty="0" err="1"/>
-              <a:t>Thr</a:t>
-            </a:r>
-            <a:r>
-              <a:rPr lang="en-US" dirty="0"/>
-              <a:t> to Ala and Val, respectively, sent for sequencing</a:t>
+              <a:t>Determine if left and right designs are associating by hydrogen bonding or solely packing</a:t>
             </a:r>
           </a:p>
         </p:txBody>
@@ -3618,7 +5917,7 @@
     </p:spTree>
     <p:extLst>
       <p:ext uri="{BB962C8B-B14F-4D97-AF65-F5344CB8AC3E}">
-        <p14:creationId xmlns:p14="http://schemas.microsoft.com/office/powerpoint/2010/main" val="2834971970"/>
+        <p14:creationId xmlns:p14="http://schemas.microsoft.com/office/powerpoint/2010/main" val="1984938636"/>
       </p:ext>
     </p:extLst>
   </p:cSld>
@@ -3650,7 +5949,7 @@
           <p:cNvPr id="2" name="Title 1">
             <a:extLst>
               <a:ext uri="{FF2B5EF4-FFF2-40B4-BE49-F238E27FC236}">
-                <a16:creationId xmlns:a16="http://schemas.microsoft.com/office/drawing/2014/main" id="{5395F485-CB01-AC37-3264-74C560A7C8A2}"/>
+                <a16:creationId xmlns:a16="http://schemas.microsoft.com/office/drawing/2014/main" id="{7E8942E6-AF4C-D353-882F-E3ADD13B85FA}"/>
               </a:ext>
             </a:extLst>
           </p:cNvPr>
@@ -3668,49 +5967,78 @@
           <a:p>
             <a:r>
               <a:rPr lang="en-US" dirty="0"/>
-              <a:t>Show </a:t>
-            </a:r>
-            <a:r>
-              <a:rPr lang="en-US" dirty="0" err="1"/>
-              <a:t>toxgreen</a:t>
-            </a:r>
+              <a:t>Identifying hydrogen bonds</a:t>
+            </a:r>
+          </a:p>
+        </p:txBody>
+      </p:sp>
+      <p:pic>
+        <p:nvPicPr>
+          <p:cNvPr id="9" name="Picture 8" descr="Green spirals of light on a black background&#10;&#10;Description automatically generated">
+            <a:extLst>
+              <a:ext uri="{FF2B5EF4-FFF2-40B4-BE49-F238E27FC236}">
+                <a16:creationId xmlns:a16="http://schemas.microsoft.com/office/drawing/2014/main" id="{34B2972A-E936-A8F9-0EEA-DD96D2181246}"/>
+              </a:ext>
+            </a:extLst>
+          </p:cNvPr>
+          <p:cNvPicPr>
+            <a:picLocks noChangeAspect="1"/>
+          </p:cNvPicPr>
+          <p:nvPr/>
+        </p:nvPicPr>
+        <p:blipFill>
+          <a:blip r:embed="rId2">
+            <a:extLst>
+              <a:ext uri="{28A0092B-C50C-407E-A947-70E740481C1C}">
+                <a14:useLocalDpi xmlns:a14="http://schemas.microsoft.com/office/drawing/2010/main" val="0"/>
+              </a:ext>
+            </a:extLst>
+          </a:blip>
+          <a:stretch>
+            <a:fillRect/>
+          </a:stretch>
+        </p:blipFill>
+        <p:spPr>
+          <a:xfrm>
+            <a:off x="3728800" y="1388268"/>
+            <a:ext cx="4747260" cy="4747260"/>
+          </a:xfrm>
+          <a:prstGeom prst="rect">
+            <a:avLst/>
+          </a:prstGeom>
+        </p:spPr>
+      </p:pic>
+      <p:sp>
+        <p:nvSpPr>
+          <p:cNvPr id="14" name="TextBox 13">
+            <a:extLst>
+              <a:ext uri="{FF2B5EF4-FFF2-40B4-BE49-F238E27FC236}">
+                <a16:creationId xmlns:a16="http://schemas.microsoft.com/office/drawing/2014/main" id="{1F1E5FE2-D166-DCBD-C18B-C8BF9662EF82}"/>
+              </a:ext>
+            </a:extLst>
+          </p:cNvPr>
+          <p:cNvSpPr txBox="1"/>
+          <p:nvPr/>
+        </p:nvSpPr>
+        <p:spPr>
+          <a:xfrm>
+            <a:off x="1021080" y="2348071"/>
+            <a:ext cx="2781300" cy="369332"/>
+          </a:xfrm>
+          <a:prstGeom prst="rect">
+            <a:avLst/>
+          </a:prstGeom>
+          <a:noFill/>
+        </p:spPr>
+        <p:txBody>
+          <a:bodyPr wrap="square" rtlCol="0">
+            <a:spAutoFit/>
+          </a:bodyPr>
+          <a:lstStyle/>
+          <a:p>
             <a:r>
               <a:rPr lang="en-US" dirty="0"/>
-              <a:t> data here</a:t>
-            </a:r>
-          </a:p>
-        </p:txBody>
-      </p:sp>
-      <p:sp>
-        <p:nvSpPr>
-          <p:cNvPr id="3" name="Content Placeholder 2">
-            <a:extLst>
-              <a:ext uri="{FF2B5EF4-FFF2-40B4-BE49-F238E27FC236}">
-                <a16:creationId xmlns:a16="http://schemas.microsoft.com/office/drawing/2014/main" id="{FB49154E-8AE6-4754-AE1D-32C1C287709A}"/>
-              </a:ext>
-            </a:extLst>
-          </p:cNvPr>
-          <p:cNvSpPr>
-            <a:spLocks noGrp="1"/>
-          </p:cNvSpPr>
-          <p:nvPr>
-            <p:ph idx="1"/>
-          </p:nvPr>
-        </p:nvSpPr>
-        <p:spPr/>
-        <p:txBody>
-          <a:bodyPr/>
-          <a:lstStyle/>
-          <a:p>
-            <a:r>
-              <a:rPr lang="en-US" dirty="0"/>
-              <a:t>Bring in the sequences gradually, then bring in the actual sequence for each</a:t>
-            </a:r>
-          </a:p>
-          <a:p>
-            <a:r>
-              <a:rPr lang="en-US" dirty="0"/>
-              <a:t>Probably could get a couple more if I really wanted (currently have 3 more mutants I could test without sending more sequencing, or could just send to get more WTs)</a:t>
+              <a:t>Take predicted structure</a:t>
             </a:r>
           </a:p>
         </p:txBody>
@@ -3718,7 +6046,965 @@
     </p:spTree>
     <p:extLst>
       <p:ext uri="{BB962C8B-B14F-4D97-AF65-F5344CB8AC3E}">
-        <p14:creationId xmlns:p14="http://schemas.microsoft.com/office/powerpoint/2010/main" val="2763258270"/>
+        <p14:creationId xmlns:p14="http://schemas.microsoft.com/office/powerpoint/2010/main" val="1921183609"/>
+      </p:ext>
+    </p:extLst>
+  </p:cSld>
+  <p:clrMapOvr>
+    <a:masterClrMapping/>
+  </p:clrMapOvr>
+</p:sld>
+</file>
+
+<file path=ppt/slides/slide5.xml><?xml version="1.0" encoding="utf-8"?>
+<p:sld xmlns:a="http://schemas.openxmlformats.org/drawingml/2006/main" xmlns:r="http://schemas.openxmlformats.org/officeDocument/2006/relationships" xmlns:p="http://schemas.openxmlformats.org/presentationml/2006/main">
+  <p:cSld>
+    <p:spTree>
+      <p:nvGrpSpPr>
+        <p:cNvPr id="1" name=""/>
+        <p:cNvGrpSpPr/>
+        <p:nvPr/>
+      </p:nvGrpSpPr>
+      <p:grpSpPr>
+        <a:xfrm>
+          <a:off x="0" y="0"/>
+          <a:ext cx="0" cy="0"/>
+          <a:chOff x="0" y="0"/>
+          <a:chExt cx="0" cy="0"/>
+        </a:xfrm>
+      </p:grpSpPr>
+      <p:pic>
+        <p:nvPicPr>
+          <p:cNvPr id="9" name="Picture 8" descr="Green spirals of light on a black background&#10;&#10;Description automatically generated">
+            <a:extLst>
+              <a:ext uri="{FF2B5EF4-FFF2-40B4-BE49-F238E27FC236}">
+                <a16:creationId xmlns:a16="http://schemas.microsoft.com/office/drawing/2014/main" id="{34B2972A-E936-A8F9-0EEA-DD96D2181246}"/>
+              </a:ext>
+            </a:extLst>
+          </p:cNvPr>
+          <p:cNvPicPr>
+            <a:picLocks noChangeAspect="1"/>
+          </p:cNvPicPr>
+          <p:nvPr/>
+        </p:nvPicPr>
+        <p:blipFill>
+          <a:blip r:embed="rId2">
+            <a:extLst>
+              <a:ext uri="{28A0092B-C50C-407E-A947-70E740481C1C}">
+                <a14:useLocalDpi xmlns:a14="http://schemas.microsoft.com/office/drawing/2010/main" val="0"/>
+              </a:ext>
+            </a:extLst>
+          </a:blip>
+          <a:stretch>
+            <a:fillRect/>
+          </a:stretch>
+        </p:blipFill>
+        <p:spPr>
+          <a:xfrm>
+            <a:off x="3728800" y="1388268"/>
+            <a:ext cx="4747260" cy="4747260"/>
+          </a:xfrm>
+          <a:prstGeom prst="rect">
+            <a:avLst/>
+          </a:prstGeom>
+        </p:spPr>
+      </p:pic>
+      <p:pic>
+        <p:nvPicPr>
+          <p:cNvPr id="11" name="Picture 10" descr="A model of a molecule&#10;&#10;Description automatically generated">
+            <a:extLst>
+              <a:ext uri="{FF2B5EF4-FFF2-40B4-BE49-F238E27FC236}">
+                <a16:creationId xmlns:a16="http://schemas.microsoft.com/office/drawing/2014/main" id="{936FAFDD-449C-A2A0-B415-1ABE60D30E58}"/>
+              </a:ext>
+            </a:extLst>
+          </p:cNvPr>
+          <p:cNvPicPr>
+            <a:picLocks noChangeAspect="1"/>
+          </p:cNvPicPr>
+          <p:nvPr/>
+        </p:nvPicPr>
+        <p:blipFill>
+          <a:blip r:embed="rId3">
+            <a:extLst>
+              <a:ext uri="{28A0092B-C50C-407E-A947-70E740481C1C}">
+                <a14:useLocalDpi xmlns:a14="http://schemas.microsoft.com/office/drawing/2010/main" val="0"/>
+              </a:ext>
+            </a:extLst>
+          </a:blip>
+          <a:stretch>
+            <a:fillRect/>
+          </a:stretch>
+        </p:blipFill>
+        <p:spPr>
+          <a:xfrm>
+            <a:off x="3735229" y="1388268"/>
+            <a:ext cx="4734401" cy="4734401"/>
+          </a:xfrm>
+          <a:prstGeom prst="rect">
+            <a:avLst/>
+          </a:prstGeom>
+        </p:spPr>
+      </p:pic>
+      <p:sp>
+        <p:nvSpPr>
+          <p:cNvPr id="6" name="TextBox 5">
+            <a:extLst>
+              <a:ext uri="{FF2B5EF4-FFF2-40B4-BE49-F238E27FC236}">
+                <a16:creationId xmlns:a16="http://schemas.microsoft.com/office/drawing/2014/main" id="{A43B67E1-3560-59CD-1150-8DEDA718BF00}"/>
+              </a:ext>
+            </a:extLst>
+          </p:cNvPr>
+          <p:cNvSpPr txBox="1"/>
+          <p:nvPr/>
+        </p:nvSpPr>
+        <p:spPr>
+          <a:xfrm>
+            <a:off x="1021080" y="2348071"/>
+            <a:ext cx="3634740" cy="1754326"/>
+          </a:xfrm>
+          <a:prstGeom prst="rect">
+            <a:avLst/>
+          </a:prstGeom>
+          <a:noFill/>
+        </p:spPr>
+        <p:txBody>
+          <a:bodyPr wrap="square" rtlCol="0">
+            <a:spAutoFit/>
+          </a:bodyPr>
+          <a:lstStyle/>
+          <a:p>
+            <a:r>
+              <a:rPr lang="en-US" dirty="0"/>
+              <a:t>Identify interfacial positions</a:t>
+            </a:r>
+          </a:p>
+          <a:p>
+            <a:endParaRPr lang="en-US" dirty="0"/>
+          </a:p>
+          <a:p>
+            <a:r>
+              <a:rPr lang="en-US" dirty="0"/>
+              <a:t>Get all Ser, </a:t>
+            </a:r>
+            <a:r>
+              <a:rPr lang="en-US" dirty="0" err="1"/>
+              <a:t>Thr</a:t>
+            </a:r>
+            <a:r>
+              <a:rPr lang="en-US" dirty="0"/>
+              <a:t>, and Tyr</a:t>
+            </a:r>
+          </a:p>
+          <a:p>
+            <a:endParaRPr lang="en-US" dirty="0"/>
+          </a:p>
+          <a:p>
+            <a:r>
+              <a:rPr lang="en-US" dirty="0"/>
+              <a:t>Identify any O within 3Å (including backbone carbonyl O)</a:t>
+            </a:r>
+          </a:p>
+        </p:txBody>
+      </p:sp>
+      <p:sp>
+        <p:nvSpPr>
+          <p:cNvPr id="7" name="Title 1">
+            <a:extLst>
+              <a:ext uri="{FF2B5EF4-FFF2-40B4-BE49-F238E27FC236}">
+                <a16:creationId xmlns:a16="http://schemas.microsoft.com/office/drawing/2014/main" id="{3FFCEBF0-938B-40C0-4345-14F2FA5AF5C1}"/>
+              </a:ext>
+            </a:extLst>
+          </p:cNvPr>
+          <p:cNvSpPr>
+            <a:spLocks noGrp="1"/>
+          </p:cNvSpPr>
+          <p:nvPr>
+            <p:ph type="title"/>
+          </p:nvPr>
+        </p:nvSpPr>
+        <p:spPr>
+          <a:xfrm>
+            <a:off x="838200" y="365125"/>
+            <a:ext cx="10515600" cy="1325563"/>
+          </a:xfrm>
+        </p:spPr>
+        <p:txBody>
+          <a:bodyPr/>
+          <a:lstStyle/>
+          <a:p>
+            <a:r>
+              <a:rPr lang="en-US" dirty="0"/>
+              <a:t>Identifying hydrogen bonds</a:t>
+            </a:r>
+          </a:p>
+        </p:txBody>
+      </p:sp>
+    </p:spTree>
+    <p:extLst>
+      <p:ext uri="{BB962C8B-B14F-4D97-AF65-F5344CB8AC3E}">
+        <p14:creationId xmlns:p14="http://schemas.microsoft.com/office/powerpoint/2010/main" val="3849964607"/>
+      </p:ext>
+    </p:extLst>
+  </p:cSld>
+  <p:clrMapOvr>
+    <a:masterClrMapping/>
+  </p:clrMapOvr>
+</p:sld>
+</file>
+
+<file path=ppt/slides/slide6.xml><?xml version="1.0" encoding="utf-8"?>
+<p:sld xmlns:a="http://schemas.openxmlformats.org/drawingml/2006/main" xmlns:r="http://schemas.openxmlformats.org/officeDocument/2006/relationships" xmlns:p="http://schemas.openxmlformats.org/presentationml/2006/main">
+  <p:cSld>
+    <p:spTree>
+      <p:nvGrpSpPr>
+        <p:cNvPr id="1" name=""/>
+        <p:cNvGrpSpPr/>
+        <p:nvPr/>
+      </p:nvGrpSpPr>
+      <p:grpSpPr>
+        <a:xfrm>
+          <a:off x="0" y="0"/>
+          <a:ext cx="0" cy="0"/>
+          <a:chOff x="0" y="0"/>
+          <a:chExt cx="0" cy="0"/>
+        </a:xfrm>
+      </p:grpSpPr>
+      <p:pic>
+        <p:nvPicPr>
+          <p:cNvPr id="7" name="Content Placeholder 4" descr="A green spiral with white balls and red and blue balls&#10;&#10;Description automatically generated">
+            <a:extLst>
+              <a:ext uri="{FF2B5EF4-FFF2-40B4-BE49-F238E27FC236}">
+                <a16:creationId xmlns:a16="http://schemas.microsoft.com/office/drawing/2014/main" id="{B3EEA2FA-7223-64A4-670B-6D720E9C7BDB}"/>
+              </a:ext>
+            </a:extLst>
+          </p:cNvPr>
+          <p:cNvPicPr>
+            <a:picLocks noChangeAspect="1"/>
+          </p:cNvPicPr>
+          <p:nvPr/>
+        </p:nvPicPr>
+        <p:blipFill>
+          <a:blip r:embed="rId2">
+            <a:extLst>
+              <a:ext uri="{28A0092B-C50C-407E-A947-70E740481C1C}">
+                <a14:useLocalDpi xmlns:a14="http://schemas.microsoft.com/office/drawing/2010/main" val="0"/>
+              </a:ext>
+            </a:extLst>
+          </a:blip>
+          <a:stretch>
+            <a:fillRect/>
+          </a:stretch>
+        </p:blipFill>
+        <p:spPr>
+          <a:xfrm>
+            <a:off x="3736419" y="1390649"/>
+            <a:ext cx="4734401" cy="4734401"/>
+          </a:xfrm>
+          <a:prstGeom prst="rect">
+            <a:avLst/>
+          </a:prstGeom>
+        </p:spPr>
+      </p:pic>
+      <p:sp>
+        <p:nvSpPr>
+          <p:cNvPr id="8" name="TextBox 7">
+            <a:extLst>
+              <a:ext uri="{FF2B5EF4-FFF2-40B4-BE49-F238E27FC236}">
+                <a16:creationId xmlns:a16="http://schemas.microsoft.com/office/drawing/2014/main" id="{5DF42CF7-2A1E-E31B-2BF4-59C60D13660C}"/>
+              </a:ext>
+            </a:extLst>
+          </p:cNvPr>
+          <p:cNvSpPr txBox="1"/>
+          <p:nvPr/>
+        </p:nvSpPr>
+        <p:spPr>
+          <a:xfrm>
+            <a:off x="327660" y="2348071"/>
+            <a:ext cx="4328160" cy="369332"/>
+          </a:xfrm>
+          <a:prstGeom prst="rect">
+            <a:avLst/>
+          </a:prstGeom>
+          <a:noFill/>
+        </p:spPr>
+        <p:txBody>
+          <a:bodyPr wrap="square" rtlCol="0">
+            <a:spAutoFit/>
+          </a:bodyPr>
+          <a:lstStyle/>
+          <a:p>
+            <a:r>
+              <a:rPr lang="en-US" dirty="0"/>
+              <a:t>Count the number of </a:t>
+            </a:r>
+            <a:r>
+              <a:rPr lang="en-US" dirty="0" err="1"/>
+              <a:t>hbond</a:t>
+            </a:r>
+            <a:r>
+              <a:rPr lang="en-US" dirty="0"/>
+              <a:t> contacts</a:t>
+            </a:r>
+          </a:p>
+        </p:txBody>
+      </p:sp>
+      <p:sp>
+        <p:nvSpPr>
+          <p:cNvPr id="10" name="Title 1">
+            <a:extLst>
+              <a:ext uri="{FF2B5EF4-FFF2-40B4-BE49-F238E27FC236}">
+                <a16:creationId xmlns:a16="http://schemas.microsoft.com/office/drawing/2014/main" id="{8542F6E0-1311-19B8-2DC9-3F4A599B7600}"/>
+              </a:ext>
+            </a:extLst>
+          </p:cNvPr>
+          <p:cNvSpPr>
+            <a:spLocks noGrp="1"/>
+          </p:cNvSpPr>
+          <p:nvPr>
+            <p:ph type="title"/>
+          </p:nvPr>
+        </p:nvSpPr>
+        <p:spPr>
+          <a:xfrm>
+            <a:off x="838200" y="365125"/>
+            <a:ext cx="10515600" cy="1325563"/>
+          </a:xfrm>
+        </p:spPr>
+        <p:txBody>
+          <a:bodyPr/>
+          <a:lstStyle/>
+          <a:p>
+            <a:r>
+              <a:rPr lang="en-US" dirty="0"/>
+              <a:t>Identifying hydrogen bonds</a:t>
+            </a:r>
+          </a:p>
+        </p:txBody>
+      </p:sp>
+    </p:spTree>
+    <p:extLst>
+      <p:ext uri="{BB962C8B-B14F-4D97-AF65-F5344CB8AC3E}">
+        <p14:creationId xmlns:p14="http://schemas.microsoft.com/office/powerpoint/2010/main" val="3707966146"/>
+      </p:ext>
+    </p:extLst>
+  </p:cSld>
+  <p:clrMapOvr>
+    <a:masterClrMapping/>
+  </p:clrMapOvr>
+</p:sld>
+</file>
+
+<file path=ppt/slides/slide7.xml><?xml version="1.0" encoding="utf-8"?>
+<p:sld xmlns:a="http://schemas.openxmlformats.org/drawingml/2006/main" xmlns:r="http://schemas.openxmlformats.org/officeDocument/2006/relationships" xmlns:p="http://schemas.openxmlformats.org/presentationml/2006/main">
+  <p:cSld>
+    <p:spTree>
+      <p:nvGrpSpPr>
+        <p:cNvPr id="1" name=""/>
+        <p:cNvGrpSpPr/>
+        <p:nvPr/>
+      </p:nvGrpSpPr>
+      <p:grpSpPr>
+        <a:xfrm>
+          <a:off x="0" y="0"/>
+          <a:ext cx="0" cy="0"/>
+          <a:chOff x="0" y="0"/>
+          <a:chExt cx="0" cy="0"/>
+        </a:xfrm>
+      </p:grpSpPr>
+      <p:pic>
+        <p:nvPicPr>
+          <p:cNvPr id="4" name="Picture 3" descr="A green spiral with red white and blue balls&#10;&#10;Description automatically generated">
+            <a:extLst>
+              <a:ext uri="{FF2B5EF4-FFF2-40B4-BE49-F238E27FC236}">
+                <a16:creationId xmlns:a16="http://schemas.microsoft.com/office/drawing/2014/main" id="{335F7C4D-217F-78BA-87A2-E5DC275EABD9}"/>
+              </a:ext>
+            </a:extLst>
+          </p:cNvPr>
+          <p:cNvPicPr>
+            <a:picLocks noChangeAspect="1"/>
+          </p:cNvPicPr>
+          <p:nvPr/>
+        </p:nvPicPr>
+        <p:blipFill>
+          <a:blip r:embed="rId2">
+            <a:extLst>
+              <a:ext uri="{28A0092B-C50C-407E-A947-70E740481C1C}">
+                <a14:useLocalDpi xmlns:a14="http://schemas.microsoft.com/office/drawing/2010/main" val="0"/>
+              </a:ext>
+            </a:extLst>
+          </a:blip>
+          <a:stretch>
+            <a:fillRect/>
+          </a:stretch>
+        </p:blipFill>
+        <p:spPr>
+          <a:xfrm>
+            <a:off x="5993130" y="1802130"/>
+            <a:ext cx="5055870" cy="5055870"/>
+          </a:xfrm>
+          <a:prstGeom prst="rect">
+            <a:avLst/>
+          </a:prstGeom>
+        </p:spPr>
+      </p:pic>
+      <p:pic>
+        <p:nvPicPr>
+          <p:cNvPr id="5" name="Content Placeholder 4" descr="A green spiral with white balls and red and blue balls&#10;&#10;Description automatically generated">
+            <a:extLst>
+              <a:ext uri="{FF2B5EF4-FFF2-40B4-BE49-F238E27FC236}">
+                <a16:creationId xmlns:a16="http://schemas.microsoft.com/office/drawing/2014/main" id="{1C7664EE-539C-5FF0-153A-7B4AB60B71AC}"/>
+              </a:ext>
+            </a:extLst>
+          </p:cNvPr>
+          <p:cNvPicPr>
+            <a:picLocks noGrp="1" noChangeAspect="1"/>
+          </p:cNvPicPr>
+          <p:nvPr>
+            <p:ph idx="1"/>
+          </p:nvPr>
+        </p:nvPicPr>
+        <p:blipFill>
+          <a:blip r:embed="rId3">
+            <a:extLst>
+              <a:ext uri="{28A0092B-C50C-407E-A947-70E740481C1C}">
+                <a14:useLocalDpi xmlns:a14="http://schemas.microsoft.com/office/drawing/2010/main" val="0"/>
+              </a:ext>
+            </a:extLst>
+          </a:blip>
+          <a:stretch>
+            <a:fillRect/>
+          </a:stretch>
+        </p:blipFill>
+        <p:spPr>
+          <a:xfrm>
+            <a:off x="475059" y="1895634"/>
+            <a:ext cx="4734401" cy="4734401"/>
+          </a:xfrm>
+        </p:spPr>
+      </p:pic>
+      <p:sp>
+        <p:nvSpPr>
+          <p:cNvPr id="6" name="Rectangle 5">
+            <a:extLst>
+              <a:ext uri="{FF2B5EF4-FFF2-40B4-BE49-F238E27FC236}">
+                <a16:creationId xmlns:a16="http://schemas.microsoft.com/office/drawing/2014/main" id="{0851C6F9-43AD-4222-94C5-54773227238D}"/>
+              </a:ext>
+            </a:extLst>
+          </p:cNvPr>
+          <p:cNvSpPr/>
+          <p:nvPr/>
+        </p:nvSpPr>
+        <p:spPr>
+          <a:xfrm>
+            <a:off x="1943100" y="2560320"/>
+            <a:ext cx="1699260" cy="1341120"/>
+          </a:xfrm>
+          <a:prstGeom prst="rect">
+            <a:avLst/>
+          </a:prstGeom>
+          <a:noFill/>
+          <a:ln w="28575"/>
+        </p:spPr>
+        <p:style>
+          <a:lnRef idx="2">
+            <a:schemeClr val="dk1">
+              <a:shade val="15000"/>
+            </a:schemeClr>
+          </a:lnRef>
+          <a:fillRef idx="1">
+            <a:schemeClr val="dk1"/>
+          </a:fillRef>
+          <a:effectRef idx="0">
+            <a:schemeClr val="dk1"/>
+          </a:effectRef>
+          <a:fontRef idx="minor">
+            <a:schemeClr val="lt1"/>
+          </a:fontRef>
+        </p:style>
+        <p:txBody>
+          <a:bodyPr rtlCol="0" anchor="ctr"/>
+          <a:lstStyle/>
+          <a:p>
+            <a:pPr algn="ctr"/>
+            <a:endParaRPr lang="en-US"/>
+          </a:p>
+        </p:txBody>
+      </p:sp>
+      <p:cxnSp>
+        <p:nvCxnSpPr>
+          <p:cNvPr id="9" name="Straight Connector 8">
+            <a:extLst>
+              <a:ext uri="{FF2B5EF4-FFF2-40B4-BE49-F238E27FC236}">
+                <a16:creationId xmlns:a16="http://schemas.microsoft.com/office/drawing/2014/main" id="{747C7073-CC96-A56A-FF25-B865302D5F1F}"/>
+              </a:ext>
+            </a:extLst>
+          </p:cNvPr>
+          <p:cNvCxnSpPr>
+            <a:cxnSpLocks/>
+          </p:cNvCxnSpPr>
+          <p:nvPr/>
+        </p:nvCxnSpPr>
+        <p:spPr>
+          <a:xfrm>
+            <a:off x="3642360" y="3901440"/>
+            <a:ext cx="2174320" cy="2591432"/>
+          </a:xfrm>
+          <a:prstGeom prst="line">
+            <a:avLst/>
+          </a:prstGeom>
+          <a:ln w="28575"/>
+        </p:spPr>
+        <p:style>
+          <a:lnRef idx="2">
+            <a:schemeClr val="dk1"/>
+          </a:lnRef>
+          <a:fillRef idx="0">
+            <a:schemeClr val="dk1"/>
+          </a:fillRef>
+          <a:effectRef idx="1">
+            <a:schemeClr val="dk1"/>
+          </a:effectRef>
+          <a:fontRef idx="minor">
+            <a:schemeClr val="tx1"/>
+          </a:fontRef>
+        </p:style>
+      </p:cxnSp>
+      <p:cxnSp>
+        <p:nvCxnSpPr>
+          <p:cNvPr id="10" name="Straight Connector 9">
+            <a:extLst>
+              <a:ext uri="{FF2B5EF4-FFF2-40B4-BE49-F238E27FC236}">
+                <a16:creationId xmlns:a16="http://schemas.microsoft.com/office/drawing/2014/main" id="{494570C0-0D14-9F8A-26F2-16B6CF132D2A}"/>
+              </a:ext>
+            </a:extLst>
+          </p:cNvPr>
+          <p:cNvCxnSpPr>
+            <a:cxnSpLocks/>
+          </p:cNvCxnSpPr>
+          <p:nvPr/>
+        </p:nvCxnSpPr>
+        <p:spPr>
+          <a:xfrm>
+            <a:off x="3642360" y="2560320"/>
+            <a:ext cx="2202180" cy="0"/>
+          </a:xfrm>
+          <a:prstGeom prst="line">
+            <a:avLst/>
+          </a:prstGeom>
+          <a:ln w="28575"/>
+        </p:spPr>
+        <p:style>
+          <a:lnRef idx="2">
+            <a:schemeClr val="dk1"/>
+          </a:lnRef>
+          <a:fillRef idx="0">
+            <a:schemeClr val="dk1"/>
+          </a:fillRef>
+          <a:effectRef idx="1">
+            <a:schemeClr val="dk1"/>
+          </a:effectRef>
+          <a:fontRef idx="minor">
+            <a:schemeClr val="tx1"/>
+          </a:fontRef>
+        </p:style>
+      </p:cxnSp>
+      <p:sp>
+        <p:nvSpPr>
+          <p:cNvPr id="13" name="Rectangle 12">
+            <a:extLst>
+              <a:ext uri="{FF2B5EF4-FFF2-40B4-BE49-F238E27FC236}">
+                <a16:creationId xmlns:a16="http://schemas.microsoft.com/office/drawing/2014/main" id="{90806396-A78B-C6D9-A8C3-F4614F6B777C}"/>
+              </a:ext>
+            </a:extLst>
+          </p:cNvPr>
+          <p:cNvSpPr/>
+          <p:nvPr/>
+        </p:nvSpPr>
+        <p:spPr>
+          <a:xfrm>
+            <a:off x="5816680" y="2560319"/>
+            <a:ext cx="5232320" cy="3932553"/>
+          </a:xfrm>
+          <a:prstGeom prst="rect">
+            <a:avLst/>
+          </a:prstGeom>
+          <a:noFill/>
+          <a:ln w="28575"/>
+        </p:spPr>
+        <p:style>
+          <a:lnRef idx="2">
+            <a:schemeClr val="dk1">
+              <a:shade val="15000"/>
+            </a:schemeClr>
+          </a:lnRef>
+          <a:fillRef idx="1">
+            <a:schemeClr val="dk1"/>
+          </a:fillRef>
+          <a:effectRef idx="0">
+            <a:schemeClr val="dk1"/>
+          </a:effectRef>
+          <a:fontRef idx="minor">
+            <a:schemeClr val="lt1"/>
+          </a:fontRef>
+        </p:style>
+        <p:txBody>
+          <a:bodyPr rtlCol="0" anchor="ctr"/>
+          <a:lstStyle/>
+          <a:p>
+            <a:pPr algn="ctr"/>
+            <a:endParaRPr lang="en-US"/>
+          </a:p>
+        </p:txBody>
+      </p:sp>
+      <p:sp>
+        <p:nvSpPr>
+          <p:cNvPr id="15" name="Title 1">
+            <a:extLst>
+              <a:ext uri="{FF2B5EF4-FFF2-40B4-BE49-F238E27FC236}">
+                <a16:creationId xmlns:a16="http://schemas.microsoft.com/office/drawing/2014/main" id="{DB25B00B-16D7-A720-D59F-811B60033A45}"/>
+              </a:ext>
+            </a:extLst>
+          </p:cNvPr>
+          <p:cNvSpPr>
+            <a:spLocks noGrp="1"/>
+          </p:cNvSpPr>
+          <p:nvPr>
+            <p:ph type="title"/>
+          </p:nvPr>
+        </p:nvSpPr>
+        <p:spPr>
+          <a:xfrm>
+            <a:off x="838200" y="365125"/>
+            <a:ext cx="10515600" cy="1325563"/>
+          </a:xfrm>
+        </p:spPr>
+        <p:txBody>
+          <a:bodyPr/>
+          <a:lstStyle/>
+          <a:p>
+            <a:r>
+              <a:rPr lang="en-US" dirty="0"/>
+              <a:t>Identifying hydrogen bonds</a:t>
+            </a:r>
+          </a:p>
+        </p:txBody>
+      </p:sp>
+    </p:spTree>
+    <p:extLst>
+      <p:ext uri="{BB962C8B-B14F-4D97-AF65-F5344CB8AC3E}">
+        <p14:creationId xmlns:p14="http://schemas.microsoft.com/office/powerpoint/2010/main" val="3478029228"/>
+      </p:ext>
+    </p:extLst>
+  </p:cSld>
+  <p:clrMapOvr>
+    <a:masterClrMapping/>
+  </p:clrMapOvr>
+</p:sld>
+</file>
+
+<file path=ppt/slides/slide8.xml><?xml version="1.0" encoding="utf-8"?>
+<p:sld xmlns:a="http://schemas.openxmlformats.org/drawingml/2006/main" xmlns:r="http://schemas.openxmlformats.org/officeDocument/2006/relationships" xmlns:p="http://schemas.openxmlformats.org/presentationml/2006/main">
+  <p:cSld>
+    <p:spTree>
+      <p:nvGrpSpPr>
+        <p:cNvPr id="1" name=""/>
+        <p:cNvGrpSpPr/>
+        <p:nvPr/>
+      </p:nvGrpSpPr>
+      <p:grpSpPr>
+        <a:xfrm>
+          <a:off x="0" y="0"/>
+          <a:ext cx="0" cy="0"/>
+          <a:chOff x="0" y="0"/>
+          <a:chExt cx="0" cy="0"/>
+        </a:xfrm>
+      </p:grpSpPr>
+      <p:sp>
+        <p:nvSpPr>
+          <p:cNvPr id="2" name="Title 1">
+            <a:extLst>
+              <a:ext uri="{FF2B5EF4-FFF2-40B4-BE49-F238E27FC236}">
+                <a16:creationId xmlns:a16="http://schemas.microsoft.com/office/drawing/2014/main" id="{78768169-4FA7-0DCE-D549-5B5B2DB8FFC9}"/>
+              </a:ext>
+            </a:extLst>
+          </p:cNvPr>
+          <p:cNvSpPr>
+            <a:spLocks noGrp="1"/>
+          </p:cNvSpPr>
+          <p:nvPr>
+            <p:ph type="title"/>
+          </p:nvPr>
+        </p:nvSpPr>
+        <p:spPr>
+          <a:xfrm>
+            <a:off x="476250" y="347344"/>
+            <a:ext cx="11239500" cy="1325563"/>
+          </a:xfrm>
+        </p:spPr>
+        <p:txBody>
+          <a:bodyPr/>
+          <a:lstStyle/>
+          <a:p>
+            <a:r>
+              <a:rPr lang="en-US" dirty="0"/>
+              <a:t>Compare designs above and below 40% </a:t>
+            </a:r>
+            <a:r>
+              <a:rPr lang="en-US" dirty="0" err="1"/>
+              <a:t>GpA</a:t>
+            </a:r>
+            <a:endParaRPr lang="en-US" dirty="0"/>
+          </a:p>
+        </p:txBody>
+      </p:sp>
+      <p:pic>
+        <p:nvPicPr>
+          <p:cNvPr id="5" name="Picture 4">
+            <a:extLst>
+              <a:ext uri="{FF2B5EF4-FFF2-40B4-BE49-F238E27FC236}">
+                <a16:creationId xmlns:a16="http://schemas.microsoft.com/office/drawing/2014/main" id="{F2EA744F-1EDE-148B-C228-9B181134E4A4}"/>
+              </a:ext>
+            </a:extLst>
+          </p:cNvPr>
+          <p:cNvPicPr>
+            <a:picLocks noChangeAspect="1"/>
+          </p:cNvPicPr>
+          <p:nvPr/>
+        </p:nvPicPr>
+        <p:blipFill rotWithShape="1">
+          <a:blip r:embed="rId2"/>
+          <a:srcRect t="-1" b="48489"/>
+          <a:stretch/>
+        </p:blipFill>
+        <p:spPr>
+          <a:xfrm>
+            <a:off x="0" y="2093297"/>
+            <a:ext cx="12192000" cy="2942233"/>
+          </a:xfrm>
+          <a:prstGeom prst="rect">
+            <a:avLst/>
+          </a:prstGeom>
+        </p:spPr>
+      </p:pic>
+      <p:cxnSp>
+        <p:nvCxnSpPr>
+          <p:cNvPr id="7" name="Straight Connector 6">
+            <a:extLst>
+              <a:ext uri="{FF2B5EF4-FFF2-40B4-BE49-F238E27FC236}">
+                <a16:creationId xmlns:a16="http://schemas.microsoft.com/office/drawing/2014/main" id="{5BBAFECF-0C1C-4834-22B3-F479F0BA54A6}"/>
+              </a:ext>
+            </a:extLst>
+          </p:cNvPr>
+          <p:cNvCxnSpPr/>
+          <p:nvPr/>
+        </p:nvCxnSpPr>
+        <p:spPr>
+          <a:xfrm>
+            <a:off x="685800" y="4023360"/>
+            <a:ext cx="6987540" cy="0"/>
+          </a:xfrm>
+          <a:prstGeom prst="line">
+            <a:avLst/>
+          </a:prstGeom>
+          <a:ln>
+            <a:solidFill>
+              <a:srgbClr val="FF0000"/>
+            </a:solidFill>
+          </a:ln>
+        </p:spPr>
+        <p:style>
+          <a:lnRef idx="2">
+            <a:schemeClr val="accent1"/>
+          </a:lnRef>
+          <a:fillRef idx="0">
+            <a:schemeClr val="accent1"/>
+          </a:fillRef>
+          <a:effectRef idx="1">
+            <a:schemeClr val="accent1"/>
+          </a:effectRef>
+          <a:fontRef idx="minor">
+            <a:schemeClr val="tx1"/>
+          </a:fontRef>
+        </p:style>
+      </p:cxnSp>
+      <p:sp>
+        <p:nvSpPr>
+          <p:cNvPr id="3" name="Rectangle 2">
+            <a:extLst>
+              <a:ext uri="{FF2B5EF4-FFF2-40B4-BE49-F238E27FC236}">
+                <a16:creationId xmlns:a16="http://schemas.microsoft.com/office/drawing/2014/main" id="{4BE576DF-C10C-1553-005C-19D648C3D2B7}"/>
+              </a:ext>
+            </a:extLst>
+          </p:cNvPr>
+          <p:cNvSpPr/>
+          <p:nvPr/>
+        </p:nvSpPr>
+        <p:spPr>
+          <a:xfrm>
+            <a:off x="7879080" y="1744980"/>
+            <a:ext cx="4312920" cy="3406122"/>
+          </a:xfrm>
+          <a:prstGeom prst="rect">
+            <a:avLst/>
+          </a:prstGeom>
+          <a:solidFill>
+            <a:schemeClr val="bg1">
+              <a:alpha val="71000"/>
+            </a:schemeClr>
+          </a:solidFill>
+          <a:ln>
+            <a:solidFill>
+              <a:schemeClr val="bg1"/>
+            </a:solidFill>
+          </a:ln>
+        </p:spPr>
+        <p:style>
+          <a:lnRef idx="2">
+            <a:schemeClr val="accent1">
+              <a:shade val="15000"/>
+            </a:schemeClr>
+          </a:lnRef>
+          <a:fillRef idx="1">
+            <a:schemeClr val="accent1"/>
+          </a:fillRef>
+          <a:effectRef idx="0">
+            <a:schemeClr val="accent1"/>
+          </a:effectRef>
+          <a:fontRef idx="minor">
+            <a:schemeClr val="lt1"/>
+          </a:fontRef>
+        </p:style>
+        <p:txBody>
+          <a:bodyPr rtlCol="0" anchor="ctr"/>
+          <a:lstStyle/>
+          <a:p>
+            <a:pPr algn="ctr"/>
+            <a:endParaRPr lang="en-US" dirty="0"/>
+          </a:p>
+        </p:txBody>
+      </p:sp>
+    </p:spTree>
+    <p:extLst>
+      <p:ext uri="{BB962C8B-B14F-4D97-AF65-F5344CB8AC3E}">
+        <p14:creationId xmlns:p14="http://schemas.microsoft.com/office/powerpoint/2010/main" val="3794073757"/>
+      </p:ext>
+    </p:extLst>
+  </p:cSld>
+  <p:clrMapOvr>
+    <a:masterClrMapping/>
+  </p:clrMapOvr>
+</p:sld>
+</file>
+
+<file path=ppt/slides/slide9.xml><?xml version="1.0" encoding="utf-8"?>
+<p:sld xmlns:a="http://schemas.openxmlformats.org/drawingml/2006/main" xmlns:r="http://schemas.openxmlformats.org/officeDocument/2006/relationships" xmlns:p="http://schemas.openxmlformats.org/presentationml/2006/main">
+  <p:cSld>
+    <p:spTree>
+      <p:nvGrpSpPr>
+        <p:cNvPr id="1" name=""/>
+        <p:cNvGrpSpPr/>
+        <p:nvPr/>
+      </p:nvGrpSpPr>
+      <p:grpSpPr>
+        <a:xfrm>
+          <a:off x="0" y="0"/>
+          <a:ext cx="0" cy="0"/>
+          <a:chOff x="0" y="0"/>
+          <a:chExt cx="0" cy="0"/>
+        </a:xfrm>
+      </p:grpSpPr>
+      <p:sp>
+        <p:nvSpPr>
+          <p:cNvPr id="2" name="Title 1">
+            <a:extLst>
+              <a:ext uri="{FF2B5EF4-FFF2-40B4-BE49-F238E27FC236}">
+                <a16:creationId xmlns:a16="http://schemas.microsoft.com/office/drawing/2014/main" id="{D24041D3-7347-8D4C-1E6B-190725BBBBB9}"/>
+              </a:ext>
+            </a:extLst>
+          </p:cNvPr>
+          <p:cNvSpPr>
+            <a:spLocks noGrp="1"/>
+          </p:cNvSpPr>
+          <p:nvPr>
+            <p:ph type="title"/>
+          </p:nvPr>
+        </p:nvSpPr>
+        <p:spPr/>
+        <p:txBody>
+          <a:bodyPr/>
+          <a:lstStyle/>
+          <a:p>
+            <a:r>
+              <a:rPr lang="en-US" dirty="0"/>
+              <a:t>20-40% of Right and Left designs have potential hydrogen bonds</a:t>
+            </a:r>
+          </a:p>
+        </p:txBody>
+      </p:sp>
+      <p:graphicFrame>
+        <p:nvGraphicFramePr>
+          <p:cNvPr id="5" name="Chart 4">
+            <a:extLst>
+              <a:ext uri="{FF2B5EF4-FFF2-40B4-BE49-F238E27FC236}">
+                <a16:creationId xmlns:a16="http://schemas.microsoft.com/office/drawing/2014/main" id="{DFB50DF8-4A5E-DE8C-E5ED-9B5DB4927E3E}"/>
+              </a:ext>
+            </a:extLst>
+          </p:cNvPr>
+          <p:cNvGraphicFramePr>
+            <a:graphicFrameLocks/>
+          </p:cNvGraphicFramePr>
+          <p:nvPr>
+            <p:extLst>
+              <p:ext uri="{D42A27DB-BD31-4B8C-83A1-F6EECF244321}">
+                <p14:modId xmlns:p14="http://schemas.microsoft.com/office/powerpoint/2010/main" val="1999050700"/>
+              </p:ext>
+            </p:extLst>
+          </p:nvPr>
+        </p:nvGraphicFramePr>
+        <p:xfrm>
+          <a:off x="349668" y="2606174"/>
+          <a:ext cx="5759622" cy="3239627"/>
+        </p:xfrm>
+        <a:graphic>
+          <a:graphicData uri="http://schemas.openxmlformats.org/drawingml/2006/chart">
+            <c:chart xmlns:c="http://schemas.openxmlformats.org/drawingml/2006/chart" xmlns:r="http://schemas.openxmlformats.org/officeDocument/2006/relationships" r:id="rId2"/>
+          </a:graphicData>
+        </a:graphic>
+      </p:graphicFrame>
+      <p:graphicFrame>
+        <p:nvGraphicFramePr>
+          <p:cNvPr id="6" name="Chart 5">
+            <a:extLst>
+              <a:ext uri="{FF2B5EF4-FFF2-40B4-BE49-F238E27FC236}">
+                <a16:creationId xmlns:a16="http://schemas.microsoft.com/office/drawing/2014/main" id="{D0B6FE9B-6D23-A028-4173-F723ACF14F74}"/>
+              </a:ext>
+            </a:extLst>
+          </p:cNvPr>
+          <p:cNvGraphicFramePr>
+            <a:graphicFrameLocks/>
+          </p:cNvGraphicFramePr>
+          <p:nvPr>
+            <p:extLst>
+              <p:ext uri="{D42A27DB-BD31-4B8C-83A1-F6EECF244321}">
+                <p14:modId xmlns:p14="http://schemas.microsoft.com/office/powerpoint/2010/main" val="966658267"/>
+              </p:ext>
+            </p:extLst>
+          </p:nvPr>
+        </p:nvGraphicFramePr>
+        <p:xfrm>
+          <a:off x="6306231" y="2606175"/>
+          <a:ext cx="5759622" cy="3239627"/>
+        </p:xfrm>
+        <a:graphic>
+          <a:graphicData uri="http://schemas.openxmlformats.org/drawingml/2006/chart">
+            <c:chart xmlns:c="http://schemas.openxmlformats.org/drawingml/2006/chart" xmlns:r="http://schemas.openxmlformats.org/officeDocument/2006/relationships" r:id="rId3"/>
+          </a:graphicData>
+        </a:graphic>
+      </p:graphicFrame>
+    </p:spTree>
+    <p:extLst>
+      <p:ext uri="{BB962C8B-B14F-4D97-AF65-F5344CB8AC3E}">
+        <p14:creationId xmlns:p14="http://schemas.microsoft.com/office/powerpoint/2010/main" val="2070076315"/>
       </p:ext>
     </p:extLst>
   </p:cSld>

</xml_diff>